<commit_message>
präsi mit bilder für sven ;-)
</commit_message>
<xml_diff>
--- a/Doc/Semantische Datenbanken_bfh.pptx
+++ b/Doc/Semantische Datenbanken_bfh.pptx
@@ -5,27 +5,29 @@
     <p:sldMasterId id="2147483669" r:id="rId4"/>
   </p:sldMasterIdLst>
   <p:notesMasterIdLst>
-    <p:notesMasterId r:id="rId20"/>
+    <p:notesMasterId r:id="rId22"/>
   </p:notesMasterIdLst>
   <p:handoutMasterIdLst>
-    <p:handoutMasterId r:id="rId21"/>
+    <p:handoutMasterId r:id="rId23"/>
   </p:handoutMasterIdLst>
   <p:sldIdLst>
     <p:sldId id="259" r:id="rId5"/>
     <p:sldId id="263" r:id="rId6"/>
     <p:sldId id="270" r:id="rId7"/>
     <p:sldId id="271" r:id="rId8"/>
-    <p:sldId id="272" r:id="rId9"/>
-    <p:sldId id="273" r:id="rId10"/>
-    <p:sldId id="274" r:id="rId11"/>
-    <p:sldId id="280" r:id="rId12"/>
-    <p:sldId id="277" r:id="rId13"/>
-    <p:sldId id="275" r:id="rId14"/>
-    <p:sldId id="281" r:id="rId15"/>
-    <p:sldId id="276" r:id="rId16"/>
-    <p:sldId id="278" r:id="rId17"/>
-    <p:sldId id="279" r:id="rId18"/>
-    <p:sldId id="257" r:id="rId19"/>
+    <p:sldId id="282" r:id="rId9"/>
+    <p:sldId id="283" r:id="rId10"/>
+    <p:sldId id="272" r:id="rId11"/>
+    <p:sldId id="273" r:id="rId12"/>
+    <p:sldId id="274" r:id="rId13"/>
+    <p:sldId id="280" r:id="rId14"/>
+    <p:sldId id="277" r:id="rId15"/>
+    <p:sldId id="275" r:id="rId16"/>
+    <p:sldId id="281" r:id="rId17"/>
+    <p:sldId id="276" r:id="rId18"/>
+    <p:sldId id="278" r:id="rId19"/>
+    <p:sldId id="279" r:id="rId20"/>
+    <p:sldId id="257" r:id="rId21"/>
   </p:sldIdLst>
   <p:sldSz cx="9144000" cy="6858000" type="screen4x3"/>
   <p:notesSz cx="7099300" cy="10234613"/>
@@ -758,15 +760,7 @@
           <a:p>
             <a:r>
               <a:rPr lang="de-CH" baseline="0" dirty="0" smtClean="0"/>
-              <a:t>Den </a:t>
-            </a:r>
-            <a:r>
-              <a:rPr lang="de-CH" baseline="0" dirty="0" err="1" smtClean="0"/>
-              <a:t>schwerpunkt</a:t>
-            </a:r>
-            <a:r>
-              <a:rPr lang="de-CH" baseline="0" dirty="0" smtClean="0"/>
-              <a:t> haben wir dabei </a:t>
+              <a:t>Den Schwerpunkt haben wir dabei </a:t>
             </a:r>
             <a:r>
               <a:rPr lang="de-CH" baseline="0" dirty="0" err="1" smtClean="0"/>
@@ -804,7 +798,7 @@
           <a:p>
             <a:r>
               <a:rPr lang="de-CH" baseline="0" dirty="0" smtClean="0"/>
-              <a:t>Wir haben uns ganz bewusst entschieden in dieser Präsentation auf die technischen Aspekte unsere Arbeit zu verzichten. Uns ist es wichtig euch in der folgenden </a:t>
+              <a:t>Wir haben uns ganz bewusst entschieden in dieser Präsentation auf die technischen Aspekte unsere Arbeit zu verzichten. Uns ist es wichtig Ihnen in der folgenden </a:t>
             </a:r>
             <a:r>
               <a:rPr lang="de-CH" baseline="0" dirty="0" err="1" smtClean="0"/>
@@ -812,7 +806,7 @@
             </a:r>
             <a:r>
               <a:rPr lang="de-CH" baseline="0" dirty="0" smtClean="0"/>
-              <a:t> einen Überblick über die Arbeit zu verschaffen. Und euch nicht mit Theorien und Techniken zu überschütten. Da es in dieser kurzen Zeit nicht möglich sein wird, diese ausführlich zu erklären. Bei Interesse für die Details sind wir ja am </a:t>
+              <a:t> einen Überblick über die Arbeit zu verschaffen. Und Ihnen nicht mit Theorien und Techniken zu überschütten. Da es in dieser kurzen Zeit nicht möglich sein wird, diese ausführlich zu erklären. Bei Interesse für die Details sind wir ja am </a:t>
             </a:r>
             <a:r>
               <a:rPr lang="de-CH" baseline="0" dirty="0" err="1" smtClean="0"/>
@@ -922,47 +916,130 @@
           <a:lstStyle/>
           <a:p>
             <a:r>
-              <a:rPr lang="de-CH" dirty="0" smtClean="0"/>
-              <a:t>Wir die </a:t>
-            </a:r>
-            <a:r>
-              <a:rPr lang="de-CH" dirty="0" err="1" smtClean="0"/>
-              <a:t>Gestalltung</a:t>
-            </a:r>
-            <a:r>
-              <a:rPr lang="de-CH" dirty="0" smtClean="0"/>
-              <a:t> und die </a:t>
-            </a:r>
-            <a:r>
-              <a:rPr lang="de-CH" dirty="0" err="1" smtClean="0"/>
-              <a:t>Modellerung</a:t>
-            </a:r>
-            <a:r>
               <a:rPr lang="de-CH" baseline="0" dirty="0" smtClean="0"/>
-              <a:t> war es für uns aber einfacher in semantischen netzten zu arbeiten. Oder besser gesagt einer </a:t>
+              <a:t>Jetzt haben wir euch erklärt weshalb wir die Domäne Reiseplaner gewählt haben und welche </a:t>
             </a:r>
             <a:r>
               <a:rPr lang="de-CH" baseline="0" dirty="0" err="1" smtClean="0"/>
-              <a:t>Abgewandeltetn</a:t>
+              <a:t>werkzeuge</a:t>
             </a:r>
             <a:r>
               <a:rPr lang="de-CH" baseline="0" dirty="0" smtClean="0"/>
-              <a:t> Form davon. Dies ist eine Graphische Darstellung von wissen</a:t>
-            </a:r>
-            <a:endParaRPr lang="de-CH" dirty="0" smtClean="0"/>
-          </a:p>
-          <a:p>
-            <a:r>
-              <a:rPr lang="de-CH" dirty="0" smtClean="0"/>
-              <a:t>Speicherung </a:t>
-            </a:r>
-            <a:r>
-              <a:rPr lang="de-CH" dirty="0" smtClean="0"/>
-              <a:t>Ontologie</a:t>
+              <a:t> wir dabei verwendet haben. Aber was heisst es denn </a:t>
+            </a:r>
+            <a:r>
+              <a:rPr lang="de-CH" baseline="0" dirty="0" err="1" smtClean="0"/>
+              <a:t>eigendlich</a:t>
             </a:r>
             <a:r>
               <a:rPr lang="de-CH" baseline="0" dirty="0" smtClean="0"/>
-              <a:t> als semantisches Netz (bzw. so ähnlich)</a:t>
+              <a:t> «eine Ontologie zu Modellieren»? Eine Ontologie hat immer die Form von Tripeln. Diese beinhalten Subjekt, Prädikat und Objekt. Was ja sehr an einen simplen deutschen Satz erinnert und auch so verstanden werden kann.</a:t>
+            </a:r>
+          </a:p>
+          <a:p>
+            <a:endParaRPr lang="de-CH" baseline="0" dirty="0" smtClean="0"/>
+          </a:p>
+          <a:p>
+            <a:endParaRPr lang="de-CH" baseline="0" dirty="0" smtClean="0"/>
+          </a:p>
+          <a:p>
+            <a:r>
+              <a:rPr lang="de-CH" baseline="0" dirty="0" smtClean="0"/>
+              <a:t>Solche </a:t>
+            </a:r>
+            <a:r>
+              <a:rPr lang="de-CH" baseline="0" dirty="0" err="1" smtClean="0"/>
+              <a:t>Ontolgien</a:t>
+            </a:r>
+            <a:r>
+              <a:rPr lang="de-CH" baseline="0" dirty="0" smtClean="0"/>
+              <a:t> werden in </a:t>
+            </a:r>
+            <a:r>
+              <a:rPr lang="de-CH" baseline="0" dirty="0" err="1" smtClean="0"/>
+              <a:t>Owl</a:t>
+            </a:r>
+            <a:r>
+              <a:rPr lang="de-CH" baseline="0" dirty="0" smtClean="0"/>
+              <a:t> einer Ontologie </a:t>
+            </a:r>
+            <a:r>
+              <a:rPr lang="de-CH" baseline="0" dirty="0" err="1" smtClean="0"/>
+              <a:t>abbildungssprache</a:t>
+            </a:r>
+            <a:r>
+              <a:rPr lang="de-CH" baseline="0" dirty="0" smtClean="0"/>
+              <a:t> abgebildet, diese hat eine XML </a:t>
+            </a:r>
+            <a:r>
+              <a:rPr lang="de-CH" baseline="0" dirty="0" err="1" smtClean="0"/>
+              <a:t>ähnilche</a:t>
+            </a:r>
+            <a:r>
+              <a:rPr lang="de-CH" baseline="0" dirty="0" smtClean="0"/>
+              <a:t> </a:t>
+            </a:r>
+            <a:r>
+              <a:rPr lang="de-CH" baseline="0" dirty="0" err="1" smtClean="0"/>
+              <a:t>schreibweise</a:t>
+            </a:r>
+            <a:r>
+              <a:rPr lang="de-CH" baseline="0" dirty="0" smtClean="0"/>
+              <a:t> und kann so </a:t>
+            </a:r>
+            <a:r>
+              <a:rPr lang="de-CH" baseline="0" dirty="0" err="1" smtClean="0"/>
+              <a:t>Hierarchies</a:t>
+            </a:r>
+            <a:r>
+              <a:rPr lang="de-CH" baseline="0" dirty="0" smtClean="0"/>
+              <a:t> </a:t>
+            </a:r>
+            <a:r>
+              <a:rPr lang="de-CH" baseline="0" dirty="0" err="1" smtClean="0"/>
+              <a:t>strukturen</a:t>
+            </a:r>
+            <a:r>
+              <a:rPr lang="de-CH" baseline="0" dirty="0" smtClean="0"/>
+              <a:t> sehr gut abbilden (es gibt </a:t>
+            </a:r>
+            <a:r>
+              <a:rPr lang="de-CH" baseline="0" dirty="0" err="1" smtClean="0"/>
+              <a:t>klassen</a:t>
+            </a:r>
+            <a:r>
+              <a:rPr lang="de-CH" baseline="0" dirty="0" smtClean="0"/>
+              <a:t>, </a:t>
+            </a:r>
+            <a:r>
+              <a:rPr lang="de-CH" baseline="0" dirty="0" err="1" smtClean="0"/>
+              <a:t>supklassen</a:t>
+            </a:r>
+            <a:r>
+              <a:rPr lang="de-CH" baseline="0" dirty="0" smtClean="0"/>
+              <a:t>, </a:t>
+            </a:r>
+            <a:r>
+              <a:rPr lang="de-CH" baseline="0" dirty="0" err="1" smtClean="0"/>
+              <a:t>Propertys</a:t>
+            </a:r>
+            <a:r>
+              <a:rPr lang="de-CH" baseline="0" dirty="0" smtClean="0"/>
+              <a:t> und </a:t>
+            </a:r>
+            <a:r>
+              <a:rPr lang="de-CH" baseline="0" dirty="0" err="1" smtClean="0"/>
+              <a:t>supprobertys</a:t>
+            </a:r>
+            <a:r>
+              <a:rPr lang="de-CH" baseline="0" dirty="0" smtClean="0"/>
+              <a:t>…)</a:t>
+            </a:r>
+          </a:p>
+          <a:p>
+            <a:r>
+              <a:rPr lang="de-CH" baseline="0" dirty="0" smtClean="0"/>
+              <a:t>Speicherung als RDF/XML in OWL Dateien</a:t>
             </a:r>
           </a:p>
           <a:p>
@@ -973,6 +1050,9 @@
               <a:rPr lang="de-CH" baseline="0" dirty="0" smtClean="0"/>
               <a:t>Mira</a:t>
             </a:r>
+            <a:endParaRPr lang="de-CH" dirty="0" smtClean="0"/>
+          </a:p>
+          <a:p>
             <a:endParaRPr lang="de-CH" dirty="0"/>
           </a:p>
         </p:txBody>
@@ -1003,7 +1083,7 @@
     </p:spTree>
     <p:extLst>
       <p:ext uri="{BB962C8B-B14F-4D97-AF65-F5344CB8AC3E}">
-        <p14:creationId xmlns:p14="http://schemas.microsoft.com/office/powerpoint/2010/main" val="3998500043"/>
+        <p14:creationId xmlns:p14="http://schemas.microsoft.com/office/powerpoint/2010/main" val="304994469"/>
       </p:ext>
     </p:extLst>
   </p:cSld>
@@ -1059,33 +1139,55 @@
           <a:p>
             <a:r>
               <a:rPr lang="de-CH" dirty="0" smtClean="0"/>
-              <a:t>Hier noch einen kurzen</a:t>
+              <a:t>Wie</a:t>
             </a:r>
             <a:r>
               <a:rPr lang="de-CH" baseline="0" dirty="0" smtClean="0"/>
-              <a:t> Blick auf einen </a:t>
+              <a:t> Herr Osterwalder bereits erwähnt hat, haben wir zur </a:t>
             </a:r>
             <a:r>
               <a:rPr lang="de-CH" baseline="0" dirty="0" err="1" smtClean="0"/>
-              <a:t>auschnitt</a:t>
+              <a:t>modelierung</a:t>
             </a:r>
             <a:r>
               <a:rPr lang="de-CH" baseline="0" dirty="0" smtClean="0"/>
-              <a:t> des </a:t>
+              <a:t> </a:t>
             </a:r>
             <a:r>
               <a:rPr lang="de-CH" baseline="0" dirty="0" err="1" smtClean="0"/>
-              <a:t>Netztes</a:t>
+              <a:t>Protege</a:t>
             </a:r>
             <a:r>
               <a:rPr lang="de-CH" baseline="0" dirty="0" smtClean="0"/>
-              <a:t>, wo man das vorherige Beispiel grad abgebildet sieht…</a:t>
-            </a:r>
-          </a:p>
-          <a:p>
-            <a:endParaRPr lang="de-CH" baseline="0" dirty="0" smtClean="0"/>
-          </a:p>
-          <a:p>
+              <a:t> verwendet. (</a:t>
+            </a:r>
+            <a:r>
+              <a:rPr lang="de-CH" baseline="0" dirty="0" err="1" smtClean="0"/>
+              <a:t>unpratkisch</a:t>
+            </a:r>
+            <a:r>
+              <a:rPr lang="de-CH" baseline="0" dirty="0" smtClean="0"/>
+              <a:t> </a:t>
+            </a:r>
+            <a:r>
+              <a:rPr lang="de-CH" baseline="0" dirty="0" err="1" smtClean="0"/>
+              <a:t>owl</a:t>
+            </a:r>
+            <a:r>
+              <a:rPr lang="de-CH" baseline="0" dirty="0" smtClean="0"/>
+              <a:t> zu schreiben). Auf diesem Bild seht Ihr ein Ausschnitt unsere Modellierung mit den Klassen und Subklassen, gewiesen (in diesem Fall ermittelten Individuen) und Einem Teil der </a:t>
+            </a:r>
+            <a:r>
+              <a:rPr lang="de-CH" baseline="0" dirty="0" err="1" smtClean="0"/>
+              <a:t>Propertys</a:t>
+            </a:r>
+            <a:endParaRPr lang="de-CH" dirty="0" smtClean="0"/>
+          </a:p>
+          <a:p>
+            <a:r>
+              <a:rPr lang="de-CH" dirty="0" smtClean="0"/>
+              <a:t>Mira</a:t>
+            </a:r>
             <a:endParaRPr lang="de-CH" dirty="0"/>
           </a:p>
         </p:txBody>
@@ -1116,7 +1218,7 @@
     </p:spTree>
     <p:extLst>
       <p:ext uri="{BB962C8B-B14F-4D97-AF65-F5344CB8AC3E}">
-        <p14:creationId xmlns:p14="http://schemas.microsoft.com/office/powerpoint/2010/main" val="859085191"/>
+        <p14:creationId xmlns:p14="http://schemas.microsoft.com/office/powerpoint/2010/main" val="482512553"/>
       </p:ext>
     </p:extLst>
   </p:cSld>
@@ -1172,7 +1274,51 @@
           <a:p>
             <a:r>
               <a:rPr lang="de-CH" dirty="0" smtClean="0"/>
-              <a:t>Sven</a:t>
+              <a:t>Wir die </a:t>
+            </a:r>
+            <a:r>
+              <a:rPr lang="de-CH" dirty="0" err="1" smtClean="0"/>
+              <a:t>Gestalltung</a:t>
+            </a:r>
+            <a:r>
+              <a:rPr lang="de-CH" dirty="0" smtClean="0"/>
+              <a:t> und die </a:t>
+            </a:r>
+            <a:r>
+              <a:rPr lang="de-CH" dirty="0" err="1" smtClean="0"/>
+              <a:t>Modellerung</a:t>
+            </a:r>
+            <a:r>
+              <a:rPr lang="de-CH" baseline="0" dirty="0" smtClean="0"/>
+              <a:t> war es für uns aber einfacher in semantischen netzten zu arbeiten. Oder besser gesagt einer </a:t>
+            </a:r>
+            <a:r>
+              <a:rPr lang="de-CH" baseline="0" dirty="0" err="1" smtClean="0"/>
+              <a:t>Abgewandeltetn</a:t>
+            </a:r>
+            <a:r>
+              <a:rPr lang="de-CH" baseline="0" dirty="0" smtClean="0"/>
+              <a:t> Form davon. Dies ist eine Graphische Darstellung von wissen</a:t>
+            </a:r>
+            <a:endParaRPr lang="de-CH" dirty="0" smtClean="0"/>
+          </a:p>
+          <a:p>
+            <a:r>
+              <a:rPr lang="de-CH" dirty="0" smtClean="0"/>
+              <a:t>Speicherung Ontologie</a:t>
+            </a:r>
+            <a:r>
+              <a:rPr lang="de-CH" baseline="0" dirty="0" smtClean="0"/>
+              <a:t> als semantisches Netz (bzw. so ähnlich)</a:t>
+            </a:r>
+          </a:p>
+          <a:p>
+            <a:endParaRPr lang="de-CH" baseline="0" dirty="0" smtClean="0"/>
+          </a:p>
+          <a:p>
+            <a:r>
+              <a:rPr lang="de-CH" baseline="0" dirty="0" smtClean="0"/>
+              <a:t>Mira</a:t>
             </a:r>
             <a:endParaRPr lang="de-CH" dirty="0"/>
           </a:p>
@@ -1204,7 +1350,7 @@
     </p:spTree>
     <p:extLst>
       <p:ext uri="{BB962C8B-B14F-4D97-AF65-F5344CB8AC3E}">
-        <p14:creationId xmlns:p14="http://schemas.microsoft.com/office/powerpoint/2010/main" val="2146561153"/>
+        <p14:creationId xmlns:p14="http://schemas.microsoft.com/office/powerpoint/2010/main" val="3998500043"/>
       </p:ext>
     </p:extLst>
   </p:cSld>
@@ -1258,7 +1404,36 @@
           <a:bodyPr/>
           <a:lstStyle/>
           <a:p>
-            <a:endParaRPr lang="de-CH"/>
+            <a:r>
+              <a:rPr lang="de-CH" dirty="0" smtClean="0"/>
+              <a:t>Hier noch einen kurzen</a:t>
+            </a:r>
+            <a:r>
+              <a:rPr lang="de-CH" baseline="0" dirty="0" smtClean="0"/>
+              <a:t> Blick auf einen </a:t>
+            </a:r>
+            <a:r>
+              <a:rPr lang="de-CH" baseline="0" dirty="0" err="1" smtClean="0"/>
+              <a:t>auschnitt</a:t>
+            </a:r>
+            <a:r>
+              <a:rPr lang="de-CH" baseline="0" dirty="0" smtClean="0"/>
+              <a:t> des </a:t>
+            </a:r>
+            <a:r>
+              <a:rPr lang="de-CH" baseline="0" dirty="0" err="1" smtClean="0"/>
+              <a:t>Netztes</a:t>
+            </a:r>
+            <a:r>
+              <a:rPr lang="de-CH" baseline="0" dirty="0" smtClean="0"/>
+              <a:t>, wo man das vorherige Beispiel grad abgebildet sieht…</a:t>
+            </a:r>
+          </a:p>
+          <a:p>
+            <a:endParaRPr lang="de-CH" baseline="0" dirty="0" smtClean="0"/>
+          </a:p>
+          <a:p>
+            <a:endParaRPr lang="de-CH" dirty="0"/>
           </a:p>
         </p:txBody>
       </p:sp>
@@ -1288,7 +1463,7 @@
     </p:spTree>
     <p:extLst>
       <p:ext uri="{BB962C8B-B14F-4D97-AF65-F5344CB8AC3E}">
-        <p14:creationId xmlns:p14="http://schemas.microsoft.com/office/powerpoint/2010/main" val="1232363155"/>
+        <p14:creationId xmlns:p14="http://schemas.microsoft.com/office/powerpoint/2010/main" val="859085191"/>
       </p:ext>
     </p:extLst>
   </p:cSld>
@@ -1344,34 +1519,8 @@
           <a:p>
             <a:r>
               <a:rPr lang="de-CH" dirty="0" smtClean="0"/>
-              <a:t>Beschränkt Intelligent: nur mit</a:t>
-            </a:r>
-            <a:r>
-              <a:rPr lang="de-CH" baseline="0" dirty="0" smtClean="0"/>
-              <a:t> unseren Regeln  intelligent; Nur simple Inferenz vorgegeben</a:t>
-            </a:r>
-            <a:endParaRPr lang="de-CH" dirty="0" smtClean="0"/>
-          </a:p>
-          <a:p>
-            <a:r>
-              <a:rPr lang="de-CH" dirty="0" smtClean="0"/>
-              <a:t>Werkzeuge:</a:t>
-            </a:r>
-            <a:r>
-              <a:rPr lang="de-CH" baseline="0" dirty="0" smtClean="0"/>
-              <a:t> Fehler/ </a:t>
-            </a:r>
-            <a:r>
-              <a:rPr lang="de-CH" baseline="0" dirty="0" err="1" smtClean="0"/>
-              <a:t>Bastlig</a:t>
-            </a:r>
-            <a:r>
-              <a:rPr lang="de-CH" baseline="0" dirty="0" smtClean="0"/>
-              <a:t>  -&gt; nur mit Kombination von zwei Werkzeugen nutzbar</a:t>
-            </a:r>
-            <a:endParaRPr lang="de-CH" dirty="0" smtClean="0"/>
-          </a:p>
-          <a:p>
+              <a:t>Sven</a:t>
+            </a:r>
             <a:endParaRPr lang="de-CH" dirty="0"/>
           </a:p>
         </p:txBody>
@@ -1402,7 +1551,7 @@
     </p:spTree>
     <p:extLst>
       <p:ext uri="{BB962C8B-B14F-4D97-AF65-F5344CB8AC3E}">
-        <p14:creationId xmlns:p14="http://schemas.microsoft.com/office/powerpoint/2010/main" val="194382555"/>
+        <p14:creationId xmlns:p14="http://schemas.microsoft.com/office/powerpoint/2010/main" val="2146561153"/>
       </p:ext>
     </p:extLst>
   </p:cSld>
@@ -1456,7 +1605,7 @@
           <a:bodyPr/>
           <a:lstStyle/>
           <a:p>
-            <a:endParaRPr lang="de-CH" dirty="0"/>
+            <a:endParaRPr lang="de-CH"/>
           </a:p>
         </p:txBody>
       </p:sp>
@@ -1478,6 +1627,241 @@
             <a:fld id="{37E44704-8E6D-4CF2-8CFA-A0F7BC751896}" type="slidenum">
               <a:rPr lang="de-CH" smtClean="0"/>
               <a:t>15</a:t>
+            </a:fld>
+            <a:endParaRPr lang="de-CH"/>
+          </a:p>
+        </p:txBody>
+      </p:sp>
+    </p:spTree>
+    <p:extLst>
+      <p:ext uri="{BB962C8B-B14F-4D97-AF65-F5344CB8AC3E}">
+        <p14:creationId xmlns:p14="http://schemas.microsoft.com/office/powerpoint/2010/main" val="1232363155"/>
+      </p:ext>
+    </p:extLst>
+  </p:cSld>
+  <p:clrMapOvr>
+    <a:masterClrMapping/>
+  </p:clrMapOvr>
+</p:notes>
+</file>
+
+<file path=ppt/notesSlides/notesSlide16.xml><?xml version="1.0" encoding="utf-8"?>
+<p:notes xmlns:a="http://schemas.openxmlformats.org/drawingml/2006/main" xmlns:r="http://schemas.openxmlformats.org/officeDocument/2006/relationships" xmlns:p="http://schemas.openxmlformats.org/presentationml/2006/main">
+  <p:cSld>
+    <p:spTree>
+      <p:nvGrpSpPr>
+        <p:cNvPr id="1" name=""/>
+        <p:cNvGrpSpPr/>
+        <p:nvPr/>
+      </p:nvGrpSpPr>
+      <p:grpSpPr>
+        <a:xfrm>
+          <a:off x="0" y="0"/>
+          <a:ext cx="0" cy="0"/>
+          <a:chOff x="0" y="0"/>
+          <a:chExt cx="0" cy="0"/>
+        </a:xfrm>
+      </p:grpSpPr>
+      <p:sp>
+        <p:nvSpPr>
+          <p:cNvPr id="2" name="Folienbildplatzhalter 1"/>
+          <p:cNvSpPr>
+            <a:spLocks noGrp="1" noRot="1" noChangeAspect="1"/>
+          </p:cNvSpPr>
+          <p:nvPr>
+            <p:ph type="sldImg"/>
+          </p:nvPr>
+        </p:nvSpPr>
+        <p:spPr/>
+      </p:sp>
+      <p:sp>
+        <p:nvSpPr>
+          <p:cNvPr id="3" name="Notizenplatzhalter 2"/>
+          <p:cNvSpPr>
+            <a:spLocks noGrp="1"/>
+          </p:cNvSpPr>
+          <p:nvPr>
+            <p:ph type="body" idx="1"/>
+          </p:nvPr>
+        </p:nvSpPr>
+        <p:spPr/>
+        <p:txBody>
+          <a:bodyPr/>
+          <a:lstStyle/>
+          <a:p>
+            <a:r>
+              <a:rPr lang="de-CH" dirty="0" smtClean="0"/>
+              <a:t>Beschränkt Intelligent: nur mit</a:t>
+            </a:r>
+            <a:r>
+              <a:rPr lang="de-CH" baseline="0" dirty="0" smtClean="0"/>
+              <a:t> unseren Regeln  intelligent; Nur simple Inferenz vorgegeben</a:t>
+            </a:r>
+            <a:endParaRPr lang="de-CH" dirty="0" smtClean="0"/>
+          </a:p>
+          <a:p>
+            <a:r>
+              <a:rPr lang="de-CH" dirty="0" smtClean="0"/>
+              <a:t>Werkzeuge:</a:t>
+            </a:r>
+            <a:r>
+              <a:rPr lang="de-CH" baseline="0" dirty="0" smtClean="0"/>
+              <a:t> Fehler/ </a:t>
+            </a:r>
+            <a:r>
+              <a:rPr lang="de-CH" baseline="0" dirty="0" err="1" smtClean="0"/>
+              <a:t>Bastlig</a:t>
+            </a:r>
+            <a:r>
+              <a:rPr lang="de-CH" baseline="0" dirty="0" smtClean="0"/>
+              <a:t>  -&gt; nur mit Kombination von zwei Werkzeugen nutzbar</a:t>
+            </a:r>
+            <a:endParaRPr lang="de-CH" dirty="0" smtClean="0"/>
+          </a:p>
+          <a:p>
+            <a:endParaRPr lang="de-CH" dirty="0" smtClean="0"/>
+          </a:p>
+          <a:p>
+            <a:r>
+              <a:rPr lang="de-CH" dirty="0" smtClean="0"/>
+              <a:t>SVEN</a:t>
+            </a:r>
+          </a:p>
+          <a:p>
+            <a:endParaRPr lang="de-CH" dirty="0" smtClean="0"/>
+          </a:p>
+          <a:p>
+            <a:r>
+              <a:rPr lang="de-CH" dirty="0" smtClean="0"/>
+              <a:t>-&gt; Fazit über unsere Arbeit ist auch noch wichtig.</a:t>
+            </a:r>
+          </a:p>
+          <a:p>
+            <a:endParaRPr lang="de-CH" dirty="0" smtClean="0"/>
+          </a:p>
+          <a:p>
+            <a:r>
+              <a:rPr lang="de-CH" dirty="0" smtClean="0"/>
+              <a:t>Was haben wir</a:t>
+            </a:r>
+            <a:r>
+              <a:rPr lang="de-CH" baseline="0" dirty="0" smtClean="0"/>
+              <a:t> für </a:t>
+            </a:r>
+            <a:r>
+              <a:rPr lang="de-CH" baseline="0" dirty="0" err="1" smtClean="0"/>
+              <a:t>erfahrungen</a:t>
+            </a:r>
+            <a:r>
+              <a:rPr lang="de-CH" baseline="0" dirty="0" smtClean="0"/>
+              <a:t> gemacht oder so</a:t>
+            </a:r>
+            <a:endParaRPr lang="de-CH" dirty="0"/>
+          </a:p>
+        </p:txBody>
+      </p:sp>
+      <p:sp>
+        <p:nvSpPr>
+          <p:cNvPr id="4" name="Foliennummernplatzhalter 3"/>
+          <p:cNvSpPr>
+            <a:spLocks noGrp="1"/>
+          </p:cNvSpPr>
+          <p:nvPr>
+            <p:ph type="sldNum" sz="quarter" idx="10"/>
+          </p:nvPr>
+        </p:nvSpPr>
+        <p:spPr/>
+        <p:txBody>
+          <a:bodyPr/>
+          <a:lstStyle/>
+          <a:p>
+            <a:fld id="{37E44704-8E6D-4CF2-8CFA-A0F7BC751896}" type="slidenum">
+              <a:rPr lang="de-CH" smtClean="0"/>
+              <a:t>16</a:t>
+            </a:fld>
+            <a:endParaRPr lang="de-CH"/>
+          </a:p>
+        </p:txBody>
+      </p:sp>
+    </p:spTree>
+    <p:extLst>
+      <p:ext uri="{BB962C8B-B14F-4D97-AF65-F5344CB8AC3E}">
+        <p14:creationId xmlns:p14="http://schemas.microsoft.com/office/powerpoint/2010/main" val="194382555"/>
+      </p:ext>
+    </p:extLst>
+  </p:cSld>
+  <p:clrMapOvr>
+    <a:masterClrMapping/>
+  </p:clrMapOvr>
+</p:notes>
+</file>
+
+<file path=ppt/notesSlides/notesSlide17.xml><?xml version="1.0" encoding="utf-8"?>
+<p:notes xmlns:a="http://schemas.openxmlformats.org/drawingml/2006/main" xmlns:r="http://schemas.openxmlformats.org/officeDocument/2006/relationships" xmlns:p="http://schemas.openxmlformats.org/presentationml/2006/main">
+  <p:cSld>
+    <p:spTree>
+      <p:nvGrpSpPr>
+        <p:cNvPr id="1" name=""/>
+        <p:cNvGrpSpPr/>
+        <p:nvPr/>
+      </p:nvGrpSpPr>
+      <p:grpSpPr>
+        <a:xfrm>
+          <a:off x="0" y="0"/>
+          <a:ext cx="0" cy="0"/>
+          <a:chOff x="0" y="0"/>
+          <a:chExt cx="0" cy="0"/>
+        </a:xfrm>
+      </p:grpSpPr>
+      <p:sp>
+        <p:nvSpPr>
+          <p:cNvPr id="2" name="Folienbildplatzhalter 1"/>
+          <p:cNvSpPr>
+            <a:spLocks noGrp="1" noRot="1" noChangeAspect="1"/>
+          </p:cNvSpPr>
+          <p:nvPr>
+            <p:ph type="sldImg"/>
+          </p:nvPr>
+        </p:nvSpPr>
+        <p:spPr/>
+      </p:sp>
+      <p:sp>
+        <p:nvSpPr>
+          <p:cNvPr id="3" name="Notizenplatzhalter 2"/>
+          <p:cNvSpPr>
+            <a:spLocks noGrp="1"/>
+          </p:cNvSpPr>
+          <p:nvPr>
+            <p:ph type="body" idx="1"/>
+          </p:nvPr>
+        </p:nvSpPr>
+        <p:spPr/>
+        <p:txBody>
+          <a:bodyPr/>
+          <a:lstStyle/>
+          <a:p>
+            <a:endParaRPr lang="de-CH" dirty="0"/>
+          </a:p>
+        </p:txBody>
+      </p:sp>
+      <p:sp>
+        <p:nvSpPr>
+          <p:cNvPr id="4" name="Foliennummernplatzhalter 3"/>
+          <p:cNvSpPr>
+            <a:spLocks noGrp="1"/>
+          </p:cNvSpPr>
+          <p:nvPr>
+            <p:ph type="sldNum" sz="quarter" idx="10"/>
+          </p:nvPr>
+        </p:nvSpPr>
+        <p:spPr/>
+        <p:txBody>
+          <a:bodyPr/>
+          <a:lstStyle/>
+          <a:p>
+            <a:fld id="{37E44704-8E6D-4CF2-8CFA-A0F7BC751896}" type="slidenum">
+              <a:rPr lang="de-CH" smtClean="0"/>
+              <a:t>17</a:t>
             </a:fld>
             <a:endParaRPr lang="de-CH"/>
           </a:p>
@@ -2148,64 +2532,7 @@
           <a:bodyPr/>
           <a:lstStyle/>
           <a:p>
-            <a:r>
-              <a:rPr lang="de-CH" dirty="0"/>
-              <a:t>In dieser Bachelorthesis soll eine solche semantische Datenbank aufgebaut und angewendet werden. Die Arbeit</a:t>
-            </a:r>
-          </a:p>
-          <a:p>
-            <a:r>
-              <a:rPr lang="de-CH" dirty="0"/>
-              <a:t>wurde in zwei Teilen umgesetzt: Einem theoretischen und einem praktischen Teil. Der theoretische Teil zeigt</a:t>
-            </a:r>
-          </a:p>
-          <a:p>
-            <a:r>
-              <a:rPr lang="de-CH" dirty="0"/>
-              <a:t>in Form eines Tutorials auf, wie ein </a:t>
-            </a:r>
-            <a:r>
-              <a:rPr lang="de-CH" dirty="0" err="1"/>
-              <a:t>knowledge</a:t>
-            </a:r>
-            <a:r>
-              <a:rPr lang="de-CH" dirty="0"/>
-              <a:t> </a:t>
-            </a:r>
-            <a:r>
-              <a:rPr lang="de-CH" dirty="0" err="1"/>
-              <a:t>engineer</a:t>
-            </a:r>
-            <a:r>
-              <a:rPr lang="de-CH" dirty="0"/>
-              <a:t> bei der Wissensmodellierung vorgehen kann. Er nutzt dabei</a:t>
-            </a:r>
-          </a:p>
-          <a:p>
-            <a:r>
-              <a:rPr lang="de-CH" dirty="0" err="1"/>
-              <a:t>Ontologien</a:t>
-            </a:r>
-            <a:r>
-              <a:rPr lang="de-CH" dirty="0"/>
-              <a:t> als Basis, um eine semantische Datenbank aufzubauen. Im praktischen Teil soll eine solche Ontologie</a:t>
-            </a:r>
-          </a:p>
-          <a:p>
-            <a:r>
-              <a:rPr lang="de-CH" dirty="0"/>
-              <a:t>aufgebaut und per Benutzerschnittstelle zugänglich gemacht werden.</a:t>
-            </a:r>
-          </a:p>
-          <a:p>
-            <a:r>
-              <a:rPr lang="de-CH" dirty="0" smtClean="0"/>
-              <a:t>Mira</a:t>
-            </a:r>
-            <a:endParaRPr lang="de-CH" dirty="0" smtClean="0"/>
-          </a:p>
-          <a:p>
-            <a:endParaRPr lang="de-CH" dirty="0"/>
+            <a:endParaRPr lang="de-CH"/>
           </a:p>
         </p:txBody>
       </p:sp>
@@ -2235,7 +2562,7 @@
     </p:spTree>
     <p:extLst>
       <p:ext uri="{BB962C8B-B14F-4D97-AF65-F5344CB8AC3E}">
-        <p14:creationId xmlns:p14="http://schemas.microsoft.com/office/powerpoint/2010/main" val="300894014"/>
+        <p14:creationId xmlns:p14="http://schemas.microsoft.com/office/powerpoint/2010/main" val="21277299"/>
       </p:ext>
     </p:extLst>
   </p:cSld>
@@ -2289,148 +2616,7 @@
           <a:bodyPr/>
           <a:lstStyle/>
           <a:p>
-            <a:r>
-              <a:rPr lang="de-CH" dirty="0" smtClean="0"/>
-              <a:t>Wie vorhin erwähnt, haben wir uns entschieden die theoretischen Grundlagen, welche wir erarbeiten mussten so abzubilden</a:t>
-            </a:r>
-            <a:r>
-              <a:rPr lang="de-CH" baseline="0" dirty="0" smtClean="0"/>
-              <a:t> (</a:t>
-            </a:r>
-            <a:r>
-              <a:rPr lang="de-CH" baseline="0" dirty="0" err="1" smtClean="0"/>
-              <a:t>niderzuschreiben</a:t>
-            </a:r>
-            <a:r>
-              <a:rPr lang="de-CH" baseline="0" dirty="0" smtClean="0"/>
-              <a:t>) das sie auch für andere gut nutzbar sind. Aus diesem Grund haben wir uns für ein Dokument mit </a:t>
-            </a:r>
-            <a:r>
-              <a:rPr lang="de-CH" baseline="0" dirty="0" err="1" smtClean="0"/>
-              <a:t>Tutorialcharakter</a:t>
-            </a:r>
-            <a:r>
-              <a:rPr lang="de-CH" baseline="0" dirty="0" smtClean="0"/>
-              <a:t> entschieden. Im Tutorial zeigen wir auf wie wir eine Problemdomäne systematisch modellieren und formalisieren um eine Ontologie zu erhalten, welche danach in Form einer semantischen Datenbank abgespeichert wird.</a:t>
-            </a:r>
-          </a:p>
-          <a:p>
-            <a:r>
-              <a:rPr lang="de-CH" baseline="0" dirty="0" smtClean="0"/>
-              <a:t>Dabei war der Schwierigste Teil, die </a:t>
-            </a:r>
-            <a:r>
-              <a:rPr lang="de-CH" baseline="0" dirty="0" err="1" smtClean="0"/>
-              <a:t>überlegung</a:t>
-            </a:r>
-            <a:r>
-              <a:rPr lang="de-CH" baseline="0" dirty="0" smtClean="0"/>
-              <a:t> wie wir den Aufbau vornehmen wollen. Ihr kennt sicher alle Tutorials, und wisst das dort das theoretische Hintergrundwissen eher spärliche vorhanden ist. Der Benutzer eines Tutorials will ja nur wissen, wie er vorgehen muss um sein Ziel zu erreichen.  Da dies aber kein normales Tutorial ist, sondern in erster Linie eine Bachelor-Thesis betrachten wir die Wissensmodellierung aus drei </a:t>
-            </a:r>
-            <a:r>
-              <a:rPr lang="de-CH" baseline="0" dirty="0" err="1" smtClean="0"/>
-              <a:t>Aspketen</a:t>
-            </a:r>
-            <a:r>
-              <a:rPr lang="de-CH" baseline="0" dirty="0" smtClean="0"/>
-              <a:t>. </a:t>
-            </a:r>
-          </a:p>
-          <a:p>
-            <a:r>
-              <a:rPr lang="de-CH" baseline="0" dirty="0" err="1" smtClean="0"/>
-              <a:t>Einerseitz</a:t>
-            </a:r>
-            <a:r>
-              <a:rPr lang="de-CH" baseline="0" dirty="0" smtClean="0"/>
-              <a:t> erhalt der Benutzer fundamentales </a:t>
-            </a:r>
-            <a:r>
-              <a:rPr lang="de-CH" baseline="0" dirty="0" err="1" smtClean="0"/>
-              <a:t>Hintegrundwissen</a:t>
-            </a:r>
-            <a:r>
-              <a:rPr lang="de-CH" baseline="0" dirty="0" smtClean="0"/>
-              <a:t> (welches aber für die </a:t>
-            </a:r>
-            <a:r>
-              <a:rPr lang="de-CH" baseline="0" dirty="0" err="1" smtClean="0"/>
-              <a:t>Umsetztung</a:t>
-            </a:r>
-            <a:r>
-              <a:rPr lang="de-CH" baseline="0" dirty="0" smtClean="0"/>
-              <a:t> nur bedingt </a:t>
-            </a:r>
-            <a:r>
-              <a:rPr lang="de-CH" baseline="0" dirty="0" err="1" smtClean="0"/>
-              <a:t>notwändigt</a:t>
-            </a:r>
-            <a:r>
-              <a:rPr lang="de-CH" baseline="0" dirty="0" smtClean="0"/>
-              <a:t> ist)</a:t>
-            </a:r>
-          </a:p>
-          <a:p>
-            <a:r>
-              <a:rPr lang="de-CH" baseline="0" dirty="0" smtClean="0"/>
-              <a:t>Anderseits </a:t>
-            </a:r>
-            <a:r>
-              <a:rPr lang="de-CH" baseline="0" dirty="0" err="1" smtClean="0"/>
-              <a:t>erklärhen</a:t>
-            </a:r>
-            <a:r>
-              <a:rPr lang="de-CH" baseline="0" dirty="0" smtClean="0"/>
-              <a:t> wir anhand eines praktischen Beispiels das konkret vorgehen. Dem </a:t>
-            </a:r>
-            <a:r>
-              <a:rPr lang="de-CH" baseline="0" dirty="0" err="1" smtClean="0"/>
-              <a:t>benutzer</a:t>
-            </a:r>
-            <a:r>
-              <a:rPr lang="de-CH" baseline="0" dirty="0" smtClean="0"/>
-              <a:t> ist es also möglich, diesem speziell </a:t>
-            </a:r>
-            <a:r>
-              <a:rPr lang="de-CH" baseline="0" dirty="0" err="1" smtClean="0"/>
-              <a:t>gekenzeichneten</a:t>
-            </a:r>
-            <a:r>
-              <a:rPr lang="de-CH" baseline="0" dirty="0" smtClean="0"/>
-              <a:t> Teil zu folgen, und ist so fähig eine semantische Datenbank aufzubauen und zu nutzen. Als dritten </a:t>
-            </a:r>
-            <a:r>
-              <a:rPr lang="de-CH" baseline="0" dirty="0" err="1" smtClean="0"/>
-              <a:t>aspekt</a:t>
-            </a:r>
-            <a:r>
-              <a:rPr lang="de-CH" baseline="0" dirty="0" smtClean="0"/>
-              <a:t> haben wir uns entschieden unsere praktischen Erfahrungen in Form von </a:t>
-            </a:r>
-            <a:r>
-              <a:rPr lang="de-CH" baseline="0" dirty="0" err="1" smtClean="0"/>
-              <a:t>Tips</a:t>
-            </a:r>
-            <a:r>
-              <a:rPr lang="de-CH" baseline="0" dirty="0" smtClean="0"/>
-              <a:t> </a:t>
-            </a:r>
-            <a:r>
-              <a:rPr lang="de-CH" baseline="0" dirty="0" err="1" smtClean="0"/>
-              <a:t>einfliesen</a:t>
-            </a:r>
-            <a:r>
-              <a:rPr lang="de-CH" baseline="0" dirty="0" smtClean="0"/>
-              <a:t> zu lassen.</a:t>
-            </a:r>
-            <a:endParaRPr lang="de-CH" dirty="0" smtClean="0"/>
-          </a:p>
-          <a:p>
-            <a:r>
-              <a:rPr lang="de-CH" dirty="0" smtClean="0"/>
-              <a:t>Mira</a:t>
-            </a:r>
-            <a:endParaRPr lang="de-CH" dirty="0"/>
+            <a:endParaRPr lang="de-CH"/>
           </a:p>
         </p:txBody>
       </p:sp>
@@ -2460,7 +2646,7 @@
     </p:spTree>
     <p:extLst>
       <p:ext uri="{BB962C8B-B14F-4D97-AF65-F5344CB8AC3E}">
-        <p14:creationId xmlns:p14="http://schemas.microsoft.com/office/powerpoint/2010/main" val="2781595221"/>
+        <p14:creationId xmlns:p14="http://schemas.microsoft.com/office/powerpoint/2010/main" val="3727243957"/>
       </p:ext>
     </p:extLst>
   </p:cSld>
@@ -2515,270 +2701,59 @@
           <a:lstStyle/>
           <a:p>
             <a:r>
+              <a:rPr lang="de-CH" dirty="0"/>
+              <a:t>In dieser Bachelorthesis soll eine solche semantische Datenbank aufgebaut und angewendet werden. Die Arbeit</a:t>
+            </a:r>
+          </a:p>
+          <a:p>
+            <a:r>
+              <a:rPr lang="de-CH" dirty="0"/>
+              <a:t>wurde in zwei Teilen umgesetzt: Einem theoretischen und einem praktischen Teil. Der theoretische Teil zeigt</a:t>
+            </a:r>
+          </a:p>
+          <a:p>
+            <a:r>
+              <a:rPr lang="de-CH" dirty="0"/>
+              <a:t>in Form eines Tutorials auf, wie ein </a:t>
+            </a:r>
+            <a:r>
+              <a:rPr lang="de-CH" dirty="0" err="1"/>
+              <a:t>knowledge</a:t>
+            </a:r>
+            <a:r>
+              <a:rPr lang="de-CH" dirty="0"/>
+              <a:t> </a:t>
+            </a:r>
+            <a:r>
+              <a:rPr lang="de-CH" dirty="0" err="1"/>
+              <a:t>engineer</a:t>
+            </a:r>
+            <a:r>
+              <a:rPr lang="de-CH" dirty="0"/>
+              <a:t> bei der Wissensmodellierung vorgehen kann. Er nutzt dabei</a:t>
+            </a:r>
+          </a:p>
+          <a:p>
+            <a:r>
+              <a:rPr lang="de-CH" dirty="0" err="1"/>
+              <a:t>Ontologien</a:t>
+            </a:r>
+            <a:r>
+              <a:rPr lang="de-CH" dirty="0"/>
+              <a:t> als Basis, um eine semantische Datenbank aufzubauen. Im praktischen Teil soll eine solche Ontologie</a:t>
+            </a:r>
+          </a:p>
+          <a:p>
+            <a:r>
+              <a:rPr lang="de-CH" dirty="0"/>
+              <a:t>aufgebaut und per Benutzerschnittstelle zugänglich gemacht werden.</a:t>
+            </a:r>
+          </a:p>
+          <a:p>
+            <a:r>
               <a:rPr lang="de-CH" dirty="0" smtClean="0"/>
-              <a:t>Wie Herr</a:t>
-            </a:r>
-            <a:r>
-              <a:rPr lang="de-CH" baseline="0" dirty="0" smtClean="0"/>
-              <a:t> Osterwalder bereits erwähnt hat, werden semantischen Datenbanken auf der Basis von </a:t>
-            </a:r>
-            <a:r>
-              <a:rPr lang="de-CH" baseline="0" dirty="0" err="1" smtClean="0"/>
-              <a:t>Ontolgoien</a:t>
-            </a:r>
-            <a:r>
-              <a:rPr lang="de-CH" baseline="0" dirty="0" smtClean="0"/>
-              <a:t> erstellt. Eine Ontologie beschreibt </a:t>
-            </a:r>
-            <a:r>
-              <a:rPr lang="de-CH" baseline="0" dirty="0" err="1" smtClean="0"/>
-              <a:t>sachwissen</a:t>
-            </a:r>
-            <a:r>
-              <a:rPr lang="de-CH" baseline="0" dirty="0" smtClean="0"/>
-              <a:t> einer </a:t>
-            </a:r>
-            <a:r>
-              <a:rPr lang="de-CH" baseline="0" dirty="0" err="1" smtClean="0"/>
-              <a:t>Probelemdomäne</a:t>
-            </a:r>
-            <a:r>
-              <a:rPr lang="de-CH" baseline="0" dirty="0" smtClean="0"/>
-              <a:t>, also eines klar definierten Ausschnitt der Welt. </a:t>
-            </a:r>
-          </a:p>
-          <a:p>
-            <a:r>
-              <a:rPr lang="de-CH" baseline="0" dirty="0" smtClean="0"/>
-              <a:t>Beim wählen der Problemdomäne sind wir schon auf die ersten </a:t>
-            </a:r>
-            <a:r>
-              <a:rPr lang="de-CH" baseline="0" dirty="0" err="1" smtClean="0"/>
-              <a:t>Schweierigkeiten</a:t>
-            </a:r>
-            <a:r>
-              <a:rPr lang="de-CH" baseline="0" dirty="0" smtClean="0"/>
-              <a:t> gestossen. Unsere </a:t>
-            </a:r>
-            <a:r>
-              <a:rPr lang="de-CH" baseline="0" dirty="0" err="1" smtClean="0"/>
-              <a:t>Ursprünliche</a:t>
-            </a:r>
-            <a:r>
-              <a:rPr lang="de-CH" baseline="0" dirty="0" smtClean="0"/>
-              <a:t> Gewählte Domäne, «das Erlernen der Programmierung am Beispiel von Prolog» hat uns vor grosse Probleme gestellt. Während der Modellierung haben wir es nicht </a:t>
-            </a:r>
-            <a:r>
-              <a:rPr lang="de-CH" baseline="0" dirty="0" err="1" smtClean="0"/>
-              <a:t>geschaften</a:t>
-            </a:r>
-            <a:r>
-              <a:rPr lang="de-CH" baseline="0" dirty="0" smtClean="0"/>
-              <a:t>, den erwarteten Mehrwert von der </a:t>
-            </a:r>
-            <a:r>
-              <a:rPr lang="de-CH" baseline="0" dirty="0" err="1" smtClean="0"/>
-              <a:t>Wissensmodelleriung</a:t>
-            </a:r>
-            <a:r>
-              <a:rPr lang="de-CH" baseline="0" dirty="0" smtClean="0"/>
-              <a:t> mittels </a:t>
-            </a:r>
-            <a:r>
-              <a:rPr lang="de-CH" baseline="0" dirty="0" err="1" smtClean="0"/>
-              <a:t>Ontologien</a:t>
-            </a:r>
-            <a:r>
-              <a:rPr lang="de-CH" baseline="0" dirty="0" smtClean="0"/>
-              <a:t> zu </a:t>
-            </a:r>
-            <a:r>
-              <a:rPr lang="de-CH" baseline="0" dirty="0" err="1" smtClean="0"/>
-              <a:t>generien</a:t>
-            </a:r>
-            <a:r>
-              <a:rPr lang="de-CH" baseline="0" dirty="0" smtClean="0"/>
-              <a:t>. Nach vielen gescheiterten Versuchen wurde uns bewusst, dass es wichtig ist eine </a:t>
-            </a:r>
-            <a:r>
-              <a:rPr lang="de-CH" baseline="0" dirty="0" err="1" smtClean="0"/>
-              <a:t>Domäen</a:t>
-            </a:r>
-            <a:r>
-              <a:rPr lang="de-CH" baseline="0" dirty="0" smtClean="0"/>
-              <a:t> zu wählen ,welche </a:t>
-            </a:r>
-            <a:r>
-              <a:rPr lang="de-CH" baseline="0" dirty="0" err="1" smtClean="0"/>
-              <a:t>schlussfolgerungen</a:t>
-            </a:r>
-            <a:r>
-              <a:rPr lang="de-CH" baseline="0" dirty="0" smtClean="0"/>
-              <a:t> mittels Inferenz erlaubt. Da dies ja ein wichtiger Teil ist um wissen mit </a:t>
-            </a:r>
-            <a:r>
-              <a:rPr lang="de-CH" baseline="0" dirty="0" err="1" smtClean="0"/>
-              <a:t>semantik</a:t>
-            </a:r>
-            <a:r>
-              <a:rPr lang="de-CH" baseline="0" dirty="0" smtClean="0"/>
-              <a:t> (also Bedeutung) zu versehen. Die </a:t>
-            </a:r>
-            <a:r>
-              <a:rPr lang="de-CH" baseline="0" dirty="0" err="1" smtClean="0"/>
-              <a:t>Ursprünlich</a:t>
-            </a:r>
-            <a:r>
-              <a:rPr lang="de-CH" baseline="0" dirty="0" smtClean="0"/>
-              <a:t> gewählte Problemdomäne hatten wir auf einer zu hohen Abstraktionsebene angesetzt.</a:t>
-            </a:r>
-          </a:p>
-          <a:p>
-            <a:endParaRPr lang="de-CH" baseline="0" dirty="0" smtClean="0"/>
-          </a:p>
-          <a:p>
-            <a:r>
-              <a:rPr lang="de-CH" baseline="0" dirty="0" smtClean="0"/>
-              <a:t>-&gt; </a:t>
-            </a:r>
-            <a:r>
-              <a:rPr lang="de-CH" baseline="0" dirty="0" err="1" smtClean="0"/>
-              <a:t>Ontologien</a:t>
-            </a:r>
-            <a:r>
-              <a:rPr lang="de-CH" baseline="0" dirty="0" smtClean="0"/>
-              <a:t> und Expertensysteme machen überall dort sin, wo ein Experte benötigt wird um das wissen zu Interpretieren. So </a:t>
-            </a:r>
-            <a:r>
-              <a:rPr lang="de-CH" baseline="0" dirty="0" err="1" smtClean="0"/>
-              <a:t>kammen</a:t>
-            </a:r>
-            <a:r>
-              <a:rPr lang="de-CH" baseline="0" dirty="0" smtClean="0"/>
-              <a:t> wir auf die </a:t>
-            </a:r>
-            <a:r>
-              <a:rPr lang="de-CH" baseline="0" dirty="0" err="1" smtClean="0"/>
-              <a:t>idee</a:t>
-            </a:r>
-            <a:r>
-              <a:rPr lang="de-CH" baseline="0" dirty="0" smtClean="0"/>
-              <a:t> der </a:t>
-            </a:r>
-            <a:r>
-              <a:rPr lang="de-CH" baseline="0" dirty="0" err="1" smtClean="0"/>
-              <a:t>Domäen</a:t>
-            </a:r>
-            <a:r>
-              <a:rPr lang="de-CH" baseline="0" dirty="0" smtClean="0"/>
-              <a:t> der Reiseplanung</a:t>
-            </a:r>
-          </a:p>
-          <a:p>
-            <a:endParaRPr lang="de-CH" baseline="0" dirty="0" smtClean="0"/>
-          </a:p>
-          <a:p>
-            <a:r>
-              <a:rPr lang="de-CH" baseline="0" dirty="0" smtClean="0"/>
-              <a:t>Sven (oh sorry, jetzt </a:t>
-            </a:r>
-            <a:r>
-              <a:rPr lang="de-CH" baseline="0" dirty="0" err="1" smtClean="0"/>
-              <a:t>hani</a:t>
-            </a:r>
-            <a:r>
-              <a:rPr lang="de-CH" baseline="0" dirty="0" smtClean="0"/>
-              <a:t> das alles </a:t>
-            </a:r>
-            <a:r>
-              <a:rPr lang="de-CH" baseline="0" dirty="0" err="1" smtClean="0"/>
-              <a:t>ufgschriebe</a:t>
-            </a:r>
-            <a:r>
-              <a:rPr lang="de-CH" baseline="0" dirty="0" smtClean="0"/>
-              <a:t> und den </a:t>
-            </a:r>
-            <a:r>
-              <a:rPr lang="de-CH" baseline="0" dirty="0" err="1" smtClean="0"/>
-              <a:t>gseh</a:t>
-            </a:r>
-            <a:r>
-              <a:rPr lang="de-CH" baseline="0" dirty="0" smtClean="0"/>
-              <a:t>, dass das </a:t>
-            </a:r>
-            <a:r>
-              <a:rPr lang="de-CH" baseline="0" dirty="0" err="1" smtClean="0"/>
-              <a:t>eigendli</a:t>
-            </a:r>
-            <a:r>
-              <a:rPr lang="de-CH" baseline="0" dirty="0" smtClean="0"/>
-              <a:t> </a:t>
-            </a:r>
-            <a:r>
-              <a:rPr lang="de-CH" baseline="0" dirty="0" err="1" smtClean="0"/>
-              <a:t>dini</a:t>
-            </a:r>
-            <a:r>
-              <a:rPr lang="de-CH" baseline="0" dirty="0" smtClean="0"/>
-              <a:t> Folie </a:t>
-            </a:r>
-            <a:r>
-              <a:rPr lang="de-CH" baseline="0" dirty="0" err="1" smtClean="0"/>
-              <a:t>isch</a:t>
-            </a:r>
-            <a:r>
-              <a:rPr lang="de-CH" baseline="0" dirty="0" smtClean="0"/>
-              <a:t>!  ;-) ) i los jetzt </a:t>
-            </a:r>
-            <a:r>
-              <a:rPr lang="de-CH" baseline="0" dirty="0" err="1" smtClean="0"/>
-              <a:t>dine</a:t>
-            </a:r>
-            <a:r>
-              <a:rPr lang="de-CH" baseline="0" dirty="0" smtClean="0"/>
-              <a:t>, </a:t>
-            </a:r>
-            <a:r>
-              <a:rPr lang="de-CH" baseline="0" dirty="0" err="1" smtClean="0"/>
-              <a:t>vlicht</a:t>
-            </a:r>
-            <a:r>
-              <a:rPr lang="de-CH" baseline="0" dirty="0" smtClean="0"/>
-              <a:t> kasch </a:t>
-            </a:r>
-            <a:r>
-              <a:rPr lang="de-CH" baseline="0" dirty="0" err="1" smtClean="0"/>
-              <a:t>jo</a:t>
-            </a:r>
-            <a:r>
-              <a:rPr lang="de-CH" baseline="0" dirty="0" smtClean="0"/>
-              <a:t> </a:t>
-            </a:r>
-            <a:r>
-              <a:rPr lang="de-CH" baseline="0" dirty="0" err="1" smtClean="0"/>
-              <a:t>öpis</a:t>
-            </a:r>
-            <a:r>
-              <a:rPr lang="de-CH" baseline="0" dirty="0" smtClean="0"/>
-              <a:t> </a:t>
-            </a:r>
-            <a:r>
-              <a:rPr lang="de-CH" baseline="0" dirty="0" err="1" smtClean="0"/>
-              <a:t>demit</a:t>
-            </a:r>
-            <a:r>
-              <a:rPr lang="de-CH" baseline="0" dirty="0" smtClean="0"/>
-              <a:t> </a:t>
-            </a:r>
-            <a:r>
-              <a:rPr lang="de-CH" baseline="0" dirty="0" err="1" smtClean="0"/>
-              <a:t>avo</a:t>
-            </a:r>
-            <a:r>
-              <a:rPr lang="de-CH" baseline="0" dirty="0" smtClean="0"/>
-              <a:t>… ;)</a:t>
-            </a:r>
-            <a:endParaRPr lang="de-CH" dirty="0" smtClean="0"/>
+              <a:t>Mira</a:t>
+            </a:r>
           </a:p>
           <a:p>
             <a:endParaRPr lang="de-CH" dirty="0"/>
@@ -2811,7 +2786,7 @@
     </p:spTree>
     <p:extLst>
       <p:ext uri="{BB962C8B-B14F-4D97-AF65-F5344CB8AC3E}">
-        <p14:creationId xmlns:p14="http://schemas.microsoft.com/office/powerpoint/2010/main" val="3377736779"/>
+        <p14:creationId xmlns:p14="http://schemas.microsoft.com/office/powerpoint/2010/main" val="300894014"/>
       </p:ext>
     </p:extLst>
   </p:cSld>
@@ -2866,65 +2841,126 @@
           <a:lstStyle/>
           <a:p>
             <a:r>
+              <a:rPr lang="de-CH" dirty="0" smtClean="0"/>
+              <a:t>Wie vorhin erwähnt, haben wir uns entschieden die theoretischen Grundlagen, welche wir erarbeiten mussten so abzubilden</a:t>
+            </a:r>
+            <a:r>
               <a:rPr lang="de-CH" baseline="0" dirty="0" smtClean="0"/>
-              <a:t>Jetzt haben wir euch erklärt weshalb wir die </a:t>
+              <a:t> (</a:t>
             </a:r>
             <a:r>
               <a:rPr lang="de-CH" baseline="0" dirty="0" err="1" smtClean="0"/>
-              <a:t>Domänereisepnaer</a:t>
+              <a:t>niderzuschreiben</a:t>
             </a:r>
             <a:r>
               <a:rPr lang="de-CH" baseline="0" dirty="0" smtClean="0"/>
-              <a:t> gewählt haben und welche </a:t>
+              <a:t>) das sie auch für andere gut nutzbar sind. Aus diesem Grund haben wir uns für ein Dokument mit </a:t>
             </a:r>
             <a:r>
               <a:rPr lang="de-CH" baseline="0" dirty="0" err="1" smtClean="0"/>
-              <a:t>werkzeuge</a:t>
+              <a:t>Tutorialcharakter</a:t>
             </a:r>
             <a:r>
               <a:rPr lang="de-CH" baseline="0" dirty="0" smtClean="0"/>
-              <a:t> wir dabei verwendet haben. Aber was heisst es denn </a:t>
+              <a:t> entschieden. Im Tutorial zeigen wir auf wie wir eine Problemdomäne systematisch modellieren und formalisieren um eine Ontologie zu erhalten, welche danach in Form einer semantischen Datenbank abgespeichert wird.</a:t>
+            </a:r>
+          </a:p>
+          <a:p>
+            <a:r>
+              <a:rPr lang="de-CH" baseline="0" dirty="0" smtClean="0"/>
+              <a:t>Dabei war der Schwierigste Teil, die </a:t>
             </a:r>
             <a:r>
               <a:rPr lang="de-CH" baseline="0" dirty="0" err="1" smtClean="0"/>
-              <a:t>eigendlich</a:t>
+              <a:t>überlegung</a:t>
             </a:r>
             <a:r>
               <a:rPr lang="de-CH" baseline="0" dirty="0" smtClean="0"/>
-              <a:t> «eine Ontologie zu Modellieren»? Eine Ontologie hat immer die Form von Tripeln. Diese beinhalten Subjekt, Prädikat und Objekt. Was ja sehr an einen simplen deutschen Satz erinnert und auch so verstanden werden kann.</a:t>
-            </a:r>
-          </a:p>
-          <a:p>
-            <a:endParaRPr lang="de-CH" baseline="0" dirty="0" smtClean="0"/>
-          </a:p>
-          <a:p>
+              <a:t> wie wir den Aufbau vornehmen wollen. Ihr kennt sicher alle Tutorials, und wisst das dort das theoretische Hintergrundwissen eher spärliche vorhanden ist. Der Benutzer eines Tutorials will ja nur wissen, wie er vorgehen muss um sein Ziel zu erreichen.  Da dies aber kein normales Tutorial ist, sondern in erster Linie eine Bachelor-Thesis betrachten wir die Wissensmodellierung aus drei </a:t>
+            </a:r>
             <a:r>
               <a:rPr lang="de-CH" baseline="0" dirty="0" err="1" smtClean="0"/>
-              <a:t>Ontologien</a:t>
+              <a:t>Aspketen</a:t>
             </a:r>
             <a:r>
               <a:rPr lang="de-CH" baseline="0" dirty="0" smtClean="0"/>
-              <a:t> bestehen aus Klassen, Individuen, Eigenschaften, Beziehungen und Regeln. Eine Klasse stellt eine «Kategorie» dar (</a:t>
-            </a:r>
+              <a:t>. </a:t>
+            </a:r>
+          </a:p>
+          <a:p>
             <a:r>
               <a:rPr lang="de-CH" baseline="0" dirty="0" err="1" smtClean="0"/>
-              <a:t>zb</a:t>
+              <a:t>Einerseitz</a:t>
             </a:r>
             <a:r>
               <a:rPr lang="de-CH" baseline="0" dirty="0" smtClean="0"/>
-              <a:t>. Ausflugsziel). Das Individuum ein Konkretes Objekt einer Klasse (</a:t>
+              <a:t> erhalt der Benutzer fundamentales </a:t>
             </a:r>
             <a:r>
               <a:rPr lang="de-CH" baseline="0" dirty="0" err="1" smtClean="0"/>
-              <a:t>Seilpark</a:t>
+              <a:t>Hintegrundwissen</a:t>
             </a:r>
             <a:r>
               <a:rPr lang="de-CH" baseline="0" dirty="0" smtClean="0"/>
-              <a:t>). Eigenschaften weisen einem Individuum einen Wert zu (</a:t>
+              <a:t> (welches aber für die </a:t>
             </a:r>
             <a:r>
               <a:rPr lang="de-CH" baseline="0" dirty="0" err="1" smtClean="0"/>
-              <a:t>zb</a:t>
+              <a:t>Umsetztung</a:t>
+            </a:r>
+            <a:r>
+              <a:rPr lang="de-CH" baseline="0" dirty="0" smtClean="0"/>
+              <a:t> nur bedingt </a:t>
+            </a:r>
+            <a:r>
+              <a:rPr lang="de-CH" baseline="0" dirty="0" err="1" smtClean="0"/>
+              <a:t>notwändigt</a:t>
+            </a:r>
+            <a:r>
+              <a:rPr lang="de-CH" baseline="0" dirty="0" smtClean="0"/>
+              <a:t> ist)</a:t>
+            </a:r>
+          </a:p>
+          <a:p>
+            <a:r>
+              <a:rPr lang="de-CH" baseline="0" dirty="0" smtClean="0"/>
+              <a:t>Anderseits </a:t>
+            </a:r>
+            <a:r>
+              <a:rPr lang="de-CH" baseline="0" dirty="0" err="1" smtClean="0"/>
+              <a:t>erklärhen</a:t>
+            </a:r>
+            <a:r>
+              <a:rPr lang="de-CH" baseline="0" dirty="0" smtClean="0"/>
+              <a:t> wir anhand eines praktischen Beispiels das konkret vorgehen. Dem </a:t>
+            </a:r>
+            <a:r>
+              <a:rPr lang="de-CH" baseline="0" dirty="0" err="1" smtClean="0"/>
+              <a:t>benutzer</a:t>
+            </a:r>
+            <a:r>
+              <a:rPr lang="de-CH" baseline="0" dirty="0" smtClean="0"/>
+              <a:t> ist es also möglich, diesem speziell </a:t>
+            </a:r>
+            <a:r>
+              <a:rPr lang="de-CH" baseline="0" dirty="0" err="1" smtClean="0"/>
+              <a:t>gekenzeichneten</a:t>
+            </a:r>
+            <a:r>
+              <a:rPr lang="de-CH" baseline="0" dirty="0" smtClean="0"/>
+              <a:t> Teil zu folgen, und ist so fähig eine semantische Datenbank aufzubauen und zu nutzen. Als dritten </a:t>
+            </a:r>
+            <a:r>
+              <a:rPr lang="de-CH" baseline="0" dirty="0" err="1" smtClean="0"/>
+              <a:t>aspekt</a:t>
+            </a:r>
+            <a:r>
+              <a:rPr lang="de-CH" baseline="0" dirty="0" smtClean="0"/>
+              <a:t> haben wir uns entschieden unsere praktischen Erfahrungen in Form von </a:t>
+            </a:r>
+            <a:r>
+              <a:rPr lang="de-CH" baseline="0" dirty="0" err="1" smtClean="0"/>
+              <a:t>Tips</a:t>
             </a:r>
             <a:r>
               <a:rPr lang="de-CH" baseline="0" dirty="0" smtClean="0"/>
@@ -2932,227 +2968,19 @@
             </a:r>
             <a:r>
               <a:rPr lang="de-CH" baseline="0" dirty="0" err="1" smtClean="0"/>
-              <a:t>anzahl</a:t>
+              <a:t>einfliesen</a:t>
             </a:r>
             <a:r>
               <a:rPr lang="de-CH" baseline="0" dirty="0" smtClean="0"/>
-              <a:t> Teilnehmer) Beziehungen bestehen zwischen zwei Individuen (</a:t>
-            </a:r>
-            <a:r>
-              <a:rPr lang="de-CH" baseline="0" dirty="0" err="1" smtClean="0"/>
-              <a:t>zb</a:t>
-            </a:r>
-            <a:r>
-              <a:rPr lang="de-CH" baseline="0" dirty="0" smtClean="0"/>
-              <a:t> </a:t>
-            </a:r>
-            <a:r>
-              <a:rPr lang="de-CH" baseline="0" dirty="0" err="1" smtClean="0"/>
-              <a:t>Seilpark</a:t>
-            </a:r>
-            <a:r>
-              <a:rPr lang="de-CH" baseline="0" dirty="0" smtClean="0"/>
-              <a:t> </a:t>
-            </a:r>
-            <a:r>
-              <a:rPr lang="de-CH" baseline="0" dirty="0" err="1" smtClean="0"/>
-              <a:t>hatStandort</a:t>
-            </a:r>
-            <a:r>
-              <a:rPr lang="de-CH" baseline="0" dirty="0" smtClean="0"/>
-              <a:t> </a:t>
-            </a:r>
-            <a:r>
-              <a:rPr lang="de-CH" baseline="0" dirty="0" err="1" smtClean="0"/>
-              <a:t>Balmberg</a:t>
-            </a:r>
-            <a:r>
-              <a:rPr lang="de-CH" baseline="0" dirty="0" smtClean="0"/>
-              <a:t> . Und setzten diese in </a:t>
-            </a:r>
-            <a:r>
-              <a:rPr lang="de-CH" baseline="0" dirty="0" err="1" smtClean="0"/>
-              <a:t>verbindung</a:t>
-            </a:r>
-            <a:r>
-              <a:rPr lang="de-CH" baseline="0" dirty="0" smtClean="0"/>
-              <a:t> miteinander. Zum Schluss sind noch die Regeln. Regeln sagen aus, diese bringen erst den </a:t>
-            </a:r>
-            <a:r>
-              <a:rPr lang="de-CH" baseline="0" dirty="0" err="1" smtClean="0"/>
-              <a:t>mehrwert</a:t>
-            </a:r>
-            <a:r>
-              <a:rPr lang="de-CH" baseline="0" dirty="0" smtClean="0"/>
-              <a:t> von </a:t>
-            </a:r>
-            <a:r>
-              <a:rPr lang="de-CH" baseline="0" dirty="0" err="1" smtClean="0"/>
-              <a:t>Ontologien</a:t>
-            </a:r>
-            <a:r>
-              <a:rPr lang="de-CH" baseline="0" dirty="0" smtClean="0"/>
-              <a:t> richtig zur Geltung. Wenn wir zum Beispiel sagen, das </a:t>
-            </a:r>
-            <a:r>
-              <a:rPr lang="de-CH" baseline="0" dirty="0" err="1" smtClean="0"/>
-              <a:t>Balmberg</a:t>
-            </a:r>
-            <a:r>
-              <a:rPr lang="de-CH" baseline="0" dirty="0" smtClean="0"/>
-              <a:t> die Region Solothurn hat. Und dann die Regel festlegen, das ein Ausflug, welcher einen Standort hat, welcher eine Region hat, auch diese Region hat…. ;-) dann können wir daraus schliessen das </a:t>
-            </a:r>
-            <a:r>
-              <a:rPr lang="de-CH" baseline="0" dirty="0" err="1" smtClean="0"/>
-              <a:t>Seilpark</a:t>
-            </a:r>
-            <a:r>
-              <a:rPr lang="de-CH" baseline="0" dirty="0" smtClean="0"/>
-              <a:t> die Region </a:t>
-            </a:r>
-            <a:r>
-              <a:rPr lang="de-CH" baseline="0" dirty="0" err="1" smtClean="0"/>
-              <a:t>Soltohurn</a:t>
-            </a:r>
-            <a:r>
-              <a:rPr lang="de-CH" baseline="0" dirty="0" smtClean="0"/>
-              <a:t> hat. Dies ist ein sehr simples </a:t>
-            </a:r>
-            <a:r>
-              <a:rPr lang="de-CH" baseline="0" dirty="0" err="1" smtClean="0"/>
-              <a:t>beispiel</a:t>
-            </a:r>
-            <a:r>
-              <a:rPr lang="de-CH" baseline="0" dirty="0" smtClean="0"/>
-              <a:t> um euch zu veranschaulichen wie </a:t>
-            </a:r>
-            <a:r>
-              <a:rPr lang="de-CH" baseline="0" dirty="0" err="1" smtClean="0"/>
-              <a:t>Ontologien</a:t>
-            </a:r>
-            <a:r>
-              <a:rPr lang="de-CH" baseline="0" dirty="0" smtClean="0"/>
-              <a:t> funktionieren. Ich möchte aber hier nicht weiter ins Detail gehen.</a:t>
-            </a:r>
-          </a:p>
-          <a:p>
-            <a:endParaRPr lang="de-CH" baseline="0" dirty="0" smtClean="0"/>
-          </a:p>
-          <a:p>
-            <a:r>
-              <a:rPr lang="de-CH" baseline="0" dirty="0" smtClean="0"/>
-              <a:t>Solche </a:t>
-            </a:r>
-            <a:r>
-              <a:rPr lang="de-CH" baseline="0" dirty="0" err="1" smtClean="0"/>
-              <a:t>Ontolgien</a:t>
-            </a:r>
-            <a:r>
-              <a:rPr lang="de-CH" baseline="0" dirty="0" smtClean="0"/>
-              <a:t> werden in </a:t>
-            </a:r>
-            <a:r>
-              <a:rPr lang="de-CH" baseline="0" dirty="0" err="1" smtClean="0"/>
-              <a:t>Owl</a:t>
-            </a:r>
-            <a:r>
-              <a:rPr lang="de-CH" baseline="0" dirty="0" smtClean="0"/>
-              <a:t> einer Ontologie </a:t>
-            </a:r>
-            <a:r>
-              <a:rPr lang="de-CH" baseline="0" dirty="0" err="1" smtClean="0"/>
-              <a:t>abbildungssprache</a:t>
-            </a:r>
-            <a:r>
-              <a:rPr lang="de-CH" baseline="0" dirty="0" smtClean="0"/>
-              <a:t> abgebildet, diese hat eine XML </a:t>
-            </a:r>
-            <a:r>
-              <a:rPr lang="de-CH" baseline="0" dirty="0" err="1" smtClean="0"/>
-              <a:t>ähnilche</a:t>
-            </a:r>
-            <a:r>
-              <a:rPr lang="de-CH" baseline="0" dirty="0" smtClean="0"/>
-              <a:t> </a:t>
-            </a:r>
-            <a:r>
-              <a:rPr lang="de-CH" baseline="0" dirty="0" err="1" smtClean="0"/>
-              <a:t>schreibweise</a:t>
-            </a:r>
-            <a:r>
-              <a:rPr lang="de-CH" baseline="0" dirty="0" smtClean="0"/>
-              <a:t> und kann so </a:t>
-            </a:r>
-            <a:r>
-              <a:rPr lang="de-CH" baseline="0" dirty="0" err="1" smtClean="0"/>
-              <a:t>Hierarchies</a:t>
-            </a:r>
-            <a:r>
-              <a:rPr lang="de-CH" baseline="0" dirty="0" smtClean="0"/>
-              <a:t> </a:t>
-            </a:r>
-            <a:r>
-              <a:rPr lang="de-CH" baseline="0" dirty="0" err="1" smtClean="0"/>
-              <a:t>strukturen</a:t>
-            </a:r>
-            <a:r>
-              <a:rPr lang="de-CH" baseline="0" dirty="0" smtClean="0"/>
-              <a:t> sehr gut abbilden (es gibt </a:t>
-            </a:r>
-            <a:r>
-              <a:rPr lang="de-CH" baseline="0" dirty="0" err="1" smtClean="0"/>
-              <a:t>klassen</a:t>
-            </a:r>
-            <a:r>
-              <a:rPr lang="de-CH" baseline="0" dirty="0" smtClean="0"/>
-              <a:t>, </a:t>
-            </a:r>
-            <a:r>
-              <a:rPr lang="de-CH" baseline="0" dirty="0" err="1" smtClean="0"/>
-              <a:t>supklassen</a:t>
-            </a:r>
-            <a:r>
-              <a:rPr lang="de-CH" baseline="0" dirty="0" smtClean="0"/>
-              <a:t>, </a:t>
-            </a:r>
-            <a:r>
-              <a:rPr lang="de-CH" baseline="0" dirty="0" err="1" smtClean="0"/>
-              <a:t>Propertys</a:t>
-            </a:r>
-            <a:r>
-              <a:rPr lang="de-CH" baseline="0" dirty="0" smtClean="0"/>
-              <a:t> und </a:t>
-            </a:r>
-            <a:r>
-              <a:rPr lang="de-CH" baseline="0" dirty="0" err="1" smtClean="0"/>
-              <a:t>supprobertys</a:t>
-            </a:r>
-            <a:r>
-              <a:rPr lang="de-CH" baseline="0" dirty="0" smtClean="0"/>
-              <a:t>…)</a:t>
-            </a:r>
-          </a:p>
-          <a:p>
-            <a:r>
-              <a:rPr lang="de-CH" baseline="0" dirty="0" smtClean="0"/>
-              <a:t>Speicherung </a:t>
-            </a:r>
-            <a:r>
-              <a:rPr lang="de-CH" baseline="0" dirty="0" smtClean="0"/>
-              <a:t>als RDF/XML in OWL Dateien</a:t>
-            </a:r>
-          </a:p>
-          <a:p>
-            <a:endParaRPr lang="de-CH" baseline="0" dirty="0" smtClean="0"/>
-          </a:p>
-          <a:p>
-            <a:r>
-              <a:rPr lang="de-CH" baseline="0" dirty="0" smtClean="0"/>
+              <a:t> zu lassen.</a:t>
+            </a:r>
+            <a:endParaRPr lang="de-CH" dirty="0" smtClean="0"/>
+          </a:p>
+          <a:p>
+            <a:r>
+              <a:rPr lang="de-CH" dirty="0" smtClean="0"/>
               <a:t>Mira</a:t>
             </a:r>
-            <a:endParaRPr lang="de-CH" dirty="0" smtClean="0"/>
-          </a:p>
-          <a:p>
             <a:endParaRPr lang="de-CH" dirty="0"/>
           </a:p>
         </p:txBody>
@@ -3183,7 +3011,7 @@
     </p:spTree>
     <p:extLst>
       <p:ext uri="{BB962C8B-B14F-4D97-AF65-F5344CB8AC3E}">
-        <p14:creationId xmlns:p14="http://schemas.microsoft.com/office/powerpoint/2010/main" val="304994469"/>
+        <p14:creationId xmlns:p14="http://schemas.microsoft.com/office/powerpoint/2010/main" val="2781595221"/>
       </p:ext>
     </p:extLst>
   </p:cSld>
@@ -3239,15 +3067,199 @@
           <a:p>
             <a:r>
               <a:rPr lang="de-CH" dirty="0" smtClean="0"/>
-              <a:t>Wie</a:t>
+              <a:t>Wie Herr</a:t>
             </a:r>
             <a:r>
               <a:rPr lang="de-CH" baseline="0" dirty="0" smtClean="0"/>
-              <a:t> Herr Osterwalder bereits erwähnt hat, haben wir zur </a:t>
+              <a:t> Osterwalder bereits erwähnt hat, werden semantischen Datenbanken auf der Basis von </a:t>
             </a:r>
             <a:r>
               <a:rPr lang="de-CH" baseline="0" dirty="0" err="1" smtClean="0"/>
-              <a:t>modelierung</a:t>
+              <a:t>Ontolgoien</a:t>
+            </a:r>
+            <a:r>
+              <a:rPr lang="de-CH" baseline="0" dirty="0" smtClean="0"/>
+              <a:t> erstellt. Eine Ontologie beschreibt </a:t>
+            </a:r>
+            <a:r>
+              <a:rPr lang="de-CH" baseline="0" dirty="0" err="1" smtClean="0"/>
+              <a:t>sachwissen</a:t>
+            </a:r>
+            <a:r>
+              <a:rPr lang="de-CH" baseline="0" dirty="0" smtClean="0"/>
+              <a:t> einer </a:t>
+            </a:r>
+            <a:r>
+              <a:rPr lang="de-CH" baseline="0" dirty="0" err="1" smtClean="0"/>
+              <a:t>Probelemdomäne</a:t>
+            </a:r>
+            <a:r>
+              <a:rPr lang="de-CH" baseline="0" dirty="0" smtClean="0"/>
+              <a:t>, also eines klar definierten Ausschnitt der Welt. </a:t>
+            </a:r>
+          </a:p>
+          <a:p>
+            <a:r>
+              <a:rPr lang="de-CH" baseline="0" dirty="0" smtClean="0"/>
+              <a:t>Beim wählen der Problemdomäne sind wir schon auf die ersten </a:t>
+            </a:r>
+            <a:r>
+              <a:rPr lang="de-CH" baseline="0" dirty="0" err="1" smtClean="0"/>
+              <a:t>Schweierigkeiten</a:t>
+            </a:r>
+            <a:r>
+              <a:rPr lang="de-CH" baseline="0" dirty="0" smtClean="0"/>
+              <a:t> gestossen. Unsere </a:t>
+            </a:r>
+            <a:r>
+              <a:rPr lang="de-CH" baseline="0" dirty="0" err="1" smtClean="0"/>
+              <a:t>Ursprünliche</a:t>
+            </a:r>
+            <a:r>
+              <a:rPr lang="de-CH" baseline="0" dirty="0" smtClean="0"/>
+              <a:t> Gewählte Domäne, «das Erlernen der Programmierung am Beispiel von Prolog» hat uns vor grosse Probleme gestellt. Während der Modellierung haben wir es nicht </a:t>
+            </a:r>
+            <a:r>
+              <a:rPr lang="de-CH" baseline="0" dirty="0" err="1" smtClean="0"/>
+              <a:t>geschaften</a:t>
+            </a:r>
+            <a:r>
+              <a:rPr lang="de-CH" baseline="0" dirty="0" smtClean="0"/>
+              <a:t>, den erwarteten Mehrwert von der </a:t>
+            </a:r>
+            <a:r>
+              <a:rPr lang="de-CH" baseline="0" dirty="0" err="1" smtClean="0"/>
+              <a:t>Wissensmodelleriung</a:t>
+            </a:r>
+            <a:r>
+              <a:rPr lang="de-CH" baseline="0" dirty="0" smtClean="0"/>
+              <a:t> mittels </a:t>
+            </a:r>
+            <a:r>
+              <a:rPr lang="de-CH" baseline="0" dirty="0" err="1" smtClean="0"/>
+              <a:t>Ontologien</a:t>
+            </a:r>
+            <a:r>
+              <a:rPr lang="de-CH" baseline="0" dirty="0" smtClean="0"/>
+              <a:t> zu </a:t>
+            </a:r>
+            <a:r>
+              <a:rPr lang="de-CH" baseline="0" dirty="0" err="1" smtClean="0"/>
+              <a:t>generien</a:t>
+            </a:r>
+            <a:r>
+              <a:rPr lang="de-CH" baseline="0" dirty="0" smtClean="0"/>
+              <a:t>. Nach vielen gescheiterten Versuchen wurde uns bewusst, dass es wichtig ist eine </a:t>
+            </a:r>
+            <a:r>
+              <a:rPr lang="de-CH" baseline="0" dirty="0" err="1" smtClean="0"/>
+              <a:t>Domäen</a:t>
+            </a:r>
+            <a:r>
+              <a:rPr lang="de-CH" baseline="0" dirty="0" smtClean="0"/>
+              <a:t> zu wählen ,welche </a:t>
+            </a:r>
+            <a:r>
+              <a:rPr lang="de-CH" baseline="0" dirty="0" err="1" smtClean="0"/>
+              <a:t>schlussfolgerungen</a:t>
+            </a:r>
+            <a:r>
+              <a:rPr lang="de-CH" baseline="0" dirty="0" smtClean="0"/>
+              <a:t> mittels Inferenz erlaubt. Da dies ja ein wichtiger Teil ist um wissen mit </a:t>
+            </a:r>
+            <a:r>
+              <a:rPr lang="de-CH" baseline="0" dirty="0" err="1" smtClean="0"/>
+              <a:t>semantik</a:t>
+            </a:r>
+            <a:r>
+              <a:rPr lang="de-CH" baseline="0" dirty="0" smtClean="0"/>
+              <a:t> (also Bedeutung) zu versehen. Die </a:t>
+            </a:r>
+            <a:r>
+              <a:rPr lang="de-CH" baseline="0" dirty="0" err="1" smtClean="0"/>
+              <a:t>Ursprünlich</a:t>
+            </a:r>
+            <a:r>
+              <a:rPr lang="de-CH" baseline="0" dirty="0" smtClean="0"/>
+              <a:t> gewählte Problemdomäne hatten wir auf einer zu hohen Abstraktionsebene angesetzt.</a:t>
+            </a:r>
+          </a:p>
+          <a:p>
+            <a:endParaRPr lang="de-CH" baseline="0" dirty="0" smtClean="0"/>
+          </a:p>
+          <a:p>
+            <a:r>
+              <a:rPr lang="de-CH" baseline="0" dirty="0" smtClean="0"/>
+              <a:t>-&gt; </a:t>
+            </a:r>
+            <a:r>
+              <a:rPr lang="de-CH" baseline="0" dirty="0" err="1" smtClean="0"/>
+              <a:t>Ontologien</a:t>
+            </a:r>
+            <a:r>
+              <a:rPr lang="de-CH" baseline="0" dirty="0" smtClean="0"/>
+              <a:t> und Expertensysteme machen überall dort sin, wo ein Experte benötigt wird um das wissen zu Interpretieren. So </a:t>
+            </a:r>
+            <a:r>
+              <a:rPr lang="de-CH" baseline="0" dirty="0" err="1" smtClean="0"/>
+              <a:t>kammen</a:t>
+            </a:r>
+            <a:r>
+              <a:rPr lang="de-CH" baseline="0" dirty="0" smtClean="0"/>
+              <a:t> wir auf die </a:t>
+            </a:r>
+            <a:r>
+              <a:rPr lang="de-CH" baseline="0" dirty="0" err="1" smtClean="0"/>
+              <a:t>idee</a:t>
+            </a:r>
+            <a:r>
+              <a:rPr lang="de-CH" baseline="0" dirty="0" smtClean="0"/>
+              <a:t> der </a:t>
+            </a:r>
+            <a:r>
+              <a:rPr lang="de-CH" baseline="0" dirty="0" err="1" smtClean="0"/>
+              <a:t>Domäen</a:t>
+            </a:r>
+            <a:r>
+              <a:rPr lang="de-CH" baseline="0" dirty="0" smtClean="0"/>
+              <a:t> der Reiseplanung</a:t>
+            </a:r>
+          </a:p>
+          <a:p>
+            <a:endParaRPr lang="de-CH" baseline="0" dirty="0" smtClean="0"/>
+          </a:p>
+          <a:p>
+            <a:r>
+              <a:rPr lang="de-CH" baseline="0" dirty="0" smtClean="0"/>
+              <a:t>Sven (oh sorry, jetzt </a:t>
+            </a:r>
+            <a:r>
+              <a:rPr lang="de-CH" baseline="0" dirty="0" err="1" smtClean="0"/>
+              <a:t>hani</a:t>
+            </a:r>
+            <a:r>
+              <a:rPr lang="de-CH" baseline="0" dirty="0" smtClean="0"/>
+              <a:t> das alles </a:t>
+            </a:r>
+            <a:r>
+              <a:rPr lang="de-CH" baseline="0" dirty="0" err="1" smtClean="0"/>
+              <a:t>ufgschriebe</a:t>
+            </a:r>
+            <a:r>
+              <a:rPr lang="de-CH" baseline="0" dirty="0" smtClean="0"/>
+              <a:t> und den </a:t>
+            </a:r>
+            <a:r>
+              <a:rPr lang="de-CH" baseline="0" dirty="0" err="1" smtClean="0"/>
+              <a:t>gseh</a:t>
+            </a:r>
+            <a:r>
+              <a:rPr lang="de-CH" baseline="0" dirty="0" smtClean="0"/>
+              <a:t>, dass das </a:t>
+            </a:r>
+            <a:r>
+              <a:rPr lang="de-CH" baseline="0" dirty="0" err="1" smtClean="0"/>
+              <a:t>eigendli</a:t>
             </a:r>
             <a:r>
               <a:rPr lang="de-CH" baseline="0" dirty="0" smtClean="0"/>
@@ -3255,15 +3267,39 @@
             </a:r>
             <a:r>
               <a:rPr lang="de-CH" baseline="0" dirty="0" err="1" smtClean="0"/>
-              <a:t>Protege</a:t>
+              <a:t>dini</a:t>
             </a:r>
             <a:r>
               <a:rPr lang="de-CH" baseline="0" dirty="0" smtClean="0"/>
-              <a:t> verwendet. (</a:t>
+              <a:t> Folie </a:t>
             </a:r>
             <a:r>
               <a:rPr lang="de-CH" baseline="0" dirty="0" err="1" smtClean="0"/>
-              <a:t>unpratkisch</a:t>
+              <a:t>isch</a:t>
+            </a:r>
+            <a:r>
+              <a:rPr lang="de-CH" baseline="0" dirty="0" smtClean="0"/>
+              <a:t>!  ;-) ) i los jetzt </a:t>
+            </a:r>
+            <a:r>
+              <a:rPr lang="de-CH" baseline="0" dirty="0" err="1" smtClean="0"/>
+              <a:t>dine</a:t>
+            </a:r>
+            <a:r>
+              <a:rPr lang="de-CH" baseline="0" dirty="0" smtClean="0"/>
+              <a:t>, </a:t>
+            </a:r>
+            <a:r>
+              <a:rPr lang="de-CH" baseline="0" dirty="0" err="1" smtClean="0"/>
+              <a:t>vlicht</a:t>
+            </a:r>
+            <a:r>
+              <a:rPr lang="de-CH" baseline="0" dirty="0" smtClean="0"/>
+              <a:t> kasch </a:t>
+            </a:r>
+            <a:r>
+              <a:rPr lang="de-CH" baseline="0" dirty="0" err="1" smtClean="0"/>
+              <a:t>jo</a:t>
             </a:r>
             <a:r>
               <a:rPr lang="de-CH" baseline="0" dirty="0" smtClean="0"/>
@@ -3271,23 +3307,31 @@
             </a:r>
             <a:r>
               <a:rPr lang="de-CH" baseline="0" dirty="0" err="1" smtClean="0"/>
-              <a:t>owl</a:t>
+              <a:t>öpis</a:t>
             </a:r>
             <a:r>
               <a:rPr lang="de-CH" baseline="0" dirty="0" smtClean="0"/>
-              <a:t> zu schreiben). Auf diesem Bild seht Ihr ein Ausschnitt unsere Modellierung mit den Klassen und Subklassen, gewiesen (in diesem Fall ermittelten Individuen) und Einem Teil der </a:t>
+              <a:t> </a:t>
             </a:r>
             <a:r>
               <a:rPr lang="de-CH" baseline="0" dirty="0" err="1" smtClean="0"/>
-              <a:t>Propertys</a:t>
+              <a:t>demit</a:t>
+            </a:r>
+            <a:r>
+              <a:rPr lang="de-CH" baseline="0" dirty="0" smtClean="0"/>
+              <a:t> </a:t>
+            </a:r>
+            <a:r>
+              <a:rPr lang="de-CH" baseline="0" dirty="0" err="1" smtClean="0"/>
+              <a:t>avo</a:t>
+            </a:r>
+            <a:r>
+              <a:rPr lang="de-CH" baseline="0" dirty="0" smtClean="0"/>
+              <a:t>… ;)</a:t>
             </a:r>
             <a:endParaRPr lang="de-CH" dirty="0" smtClean="0"/>
           </a:p>
           <a:p>
-            <a:r>
-              <a:rPr lang="de-CH" dirty="0" smtClean="0"/>
-              <a:t>Mira</a:t>
-            </a:r>
             <a:endParaRPr lang="de-CH" dirty="0"/>
           </a:p>
         </p:txBody>
@@ -3318,7 +3362,7 @@
     </p:spTree>
     <p:extLst>
       <p:ext uri="{BB962C8B-B14F-4D97-AF65-F5344CB8AC3E}">
-        <p14:creationId xmlns:p14="http://schemas.microsoft.com/office/powerpoint/2010/main" val="482512553"/>
+        <p14:creationId xmlns:p14="http://schemas.microsoft.com/office/powerpoint/2010/main" val="3377736779"/>
       </p:ext>
     </p:extLst>
   </p:cSld>
@@ -9475,6 +9519,276 @@
       </p:grpSpPr>
       <p:sp>
         <p:nvSpPr>
+          <p:cNvPr id="2" name="Inhaltsplatzhalter 1"/>
+          <p:cNvSpPr>
+            <a:spLocks noGrp="1"/>
+          </p:cNvSpPr>
+          <p:nvPr>
+            <p:ph sz="half" idx="1"/>
+          </p:nvPr>
+        </p:nvSpPr>
+        <p:spPr/>
+        <p:txBody>
+          <a:bodyPr/>
+          <a:lstStyle/>
+          <a:p>
+            <a:r>
+              <a:rPr lang="de-CH" dirty="0" smtClean="0"/>
+              <a:t>Tripel</a:t>
+            </a:r>
+          </a:p>
+          <a:p>
+            <a:pPr lvl="1"/>
+            <a:r>
+              <a:rPr lang="de-CH" dirty="0" smtClean="0"/>
+              <a:t>Subjekt</a:t>
+            </a:r>
+          </a:p>
+          <a:p>
+            <a:pPr lvl="1"/>
+            <a:r>
+              <a:rPr lang="de-CH" dirty="0" smtClean="0"/>
+              <a:t>Prädikat</a:t>
+            </a:r>
+          </a:p>
+          <a:p>
+            <a:pPr lvl="1"/>
+            <a:r>
+              <a:rPr lang="de-CH" dirty="0" smtClean="0"/>
+              <a:t>Objekt</a:t>
+            </a:r>
+          </a:p>
+          <a:p>
+            <a:pPr lvl="1"/>
+            <a:endParaRPr lang="de-CH" dirty="0"/>
+          </a:p>
+          <a:p>
+            <a:r>
+              <a:rPr lang="de-CH" dirty="0"/>
+              <a:t>Bestandteile</a:t>
+            </a:r>
+          </a:p>
+          <a:p>
+            <a:pPr lvl="1"/>
+            <a:r>
+              <a:rPr lang="de-CH" dirty="0"/>
+              <a:t>Klassen</a:t>
+            </a:r>
+          </a:p>
+          <a:p>
+            <a:pPr lvl="1"/>
+            <a:r>
+              <a:rPr lang="de-CH" dirty="0"/>
+              <a:t>Individuen</a:t>
+            </a:r>
+          </a:p>
+          <a:p>
+            <a:pPr lvl="1"/>
+            <a:r>
+              <a:rPr lang="de-CH" dirty="0"/>
+              <a:t>Eigenschaften </a:t>
+            </a:r>
+          </a:p>
+          <a:p>
+            <a:pPr lvl="1"/>
+            <a:r>
+              <a:rPr lang="de-CH" dirty="0"/>
+              <a:t>Beziehungen</a:t>
+            </a:r>
+          </a:p>
+          <a:p>
+            <a:pPr lvl="1"/>
+            <a:r>
+              <a:rPr lang="de-CH" dirty="0"/>
+              <a:t>Regeln</a:t>
+            </a:r>
+          </a:p>
+          <a:p>
+            <a:endParaRPr lang="de-CH" dirty="0"/>
+          </a:p>
+          <a:p>
+            <a:endParaRPr lang="de-CH" dirty="0" smtClean="0"/>
+          </a:p>
+          <a:p>
+            <a:pPr marL="457200" lvl="1" indent="0">
+              <a:buNone/>
+            </a:pPr>
+            <a:endParaRPr lang="de-CH" dirty="0">
+              <a:sym typeface="Wingdings" panose="05000000000000000000" pitchFamily="2" charset="2"/>
+            </a:endParaRPr>
+          </a:p>
+          <a:p>
+            <a:pPr marL="0" indent="0">
+              <a:buNone/>
+            </a:pPr>
+            <a:endParaRPr lang="de-CH" dirty="0"/>
+          </a:p>
+        </p:txBody>
+      </p:sp>
+      <p:sp>
+        <p:nvSpPr>
+          <p:cNvPr id="3" name="Titel 2"/>
+          <p:cNvSpPr>
+            <a:spLocks noGrp="1"/>
+          </p:cNvSpPr>
+          <p:nvPr>
+            <p:ph type="ctrTitle"/>
+          </p:nvPr>
+        </p:nvSpPr>
+        <p:spPr/>
+        <p:txBody>
+          <a:bodyPr/>
+          <a:lstStyle/>
+          <a:p>
+            <a:r>
+              <a:rPr lang="de-CH" dirty="0"/>
+              <a:t>Aufbau Ontologie</a:t>
+            </a:r>
+          </a:p>
+        </p:txBody>
+      </p:sp>
+    </p:spTree>
+    <p:extLst>
+      <p:ext uri="{BB962C8B-B14F-4D97-AF65-F5344CB8AC3E}">
+        <p14:creationId xmlns:p14="http://schemas.microsoft.com/office/powerpoint/2010/main" val="2926770482"/>
+      </p:ext>
+    </p:extLst>
+  </p:cSld>
+  <p:clrMapOvr>
+    <a:masterClrMapping/>
+  </p:clrMapOvr>
+  <p:timing>
+    <p:tnLst>
+      <p:par>
+        <p:cTn id="1" dur="indefinite" restart="never" nodeType="tmRoot"/>
+      </p:par>
+    </p:tnLst>
+  </p:timing>
+</p:sld>
+</file>
+
+<file path=ppt/slides/slide11.xml><?xml version="1.0" encoding="utf-8"?>
+<p:sld xmlns:a="http://schemas.openxmlformats.org/drawingml/2006/main" xmlns:r="http://schemas.openxmlformats.org/officeDocument/2006/relationships" xmlns:p="http://schemas.openxmlformats.org/presentationml/2006/main">
+  <p:cSld>
+    <p:spTree>
+      <p:nvGrpSpPr>
+        <p:cNvPr id="1" name=""/>
+        <p:cNvGrpSpPr/>
+        <p:nvPr/>
+      </p:nvGrpSpPr>
+      <p:grpSpPr>
+        <a:xfrm>
+          <a:off x="0" y="0"/>
+          <a:ext cx="0" cy="0"/>
+          <a:chOff x="0" y="0"/>
+          <a:chExt cx="0" cy="0"/>
+        </a:xfrm>
+      </p:grpSpPr>
+      <p:sp>
+        <p:nvSpPr>
+          <p:cNvPr id="3" name="Titel 2"/>
+          <p:cNvSpPr>
+            <a:spLocks noGrp="1"/>
+          </p:cNvSpPr>
+          <p:nvPr>
+            <p:ph type="ctrTitle"/>
+          </p:nvPr>
+        </p:nvSpPr>
+        <p:spPr/>
+        <p:txBody>
+          <a:bodyPr/>
+          <a:lstStyle/>
+          <a:p>
+            <a:r>
+              <a:rPr lang="de-CH" dirty="0" smtClean="0"/>
+              <a:t>Ontologie abbilden</a:t>
+            </a:r>
+            <a:endParaRPr lang="de-CH" dirty="0"/>
+          </a:p>
+        </p:txBody>
+      </p:sp>
+      <p:sp>
+        <p:nvSpPr>
+          <p:cNvPr id="2" name="Inhaltsplatzhalter 1"/>
+          <p:cNvSpPr>
+            <a:spLocks noGrp="1"/>
+          </p:cNvSpPr>
+          <p:nvPr>
+            <p:ph sz="half" idx="1"/>
+          </p:nvPr>
+        </p:nvSpPr>
+        <p:spPr/>
+        <p:txBody>
+          <a:bodyPr/>
+          <a:lstStyle/>
+          <a:p>
+            <a:endParaRPr lang="de-CH" dirty="0"/>
+          </a:p>
+        </p:txBody>
+      </p:sp>
+      <p:pic>
+        <p:nvPicPr>
+          <p:cNvPr id="4" name="Grafik 3"/>
+          <p:cNvPicPr>
+            <a:picLocks noChangeAspect="1"/>
+          </p:cNvPicPr>
+          <p:nvPr/>
+        </p:nvPicPr>
+        <p:blipFill>
+          <a:blip r:embed="rId3"/>
+          <a:stretch>
+            <a:fillRect/>
+          </a:stretch>
+        </p:blipFill>
+        <p:spPr>
+          <a:xfrm>
+            <a:off x="468000" y="1439999"/>
+            <a:ext cx="8019112" cy="3226891"/>
+          </a:xfrm>
+          <a:prstGeom prst="rect">
+            <a:avLst/>
+          </a:prstGeom>
+        </p:spPr>
+      </p:pic>
+    </p:spTree>
+    <p:extLst>
+      <p:ext uri="{BB962C8B-B14F-4D97-AF65-F5344CB8AC3E}">
+        <p14:creationId xmlns:p14="http://schemas.microsoft.com/office/powerpoint/2010/main" val="493163707"/>
+      </p:ext>
+    </p:extLst>
+  </p:cSld>
+  <p:clrMapOvr>
+    <a:masterClrMapping/>
+  </p:clrMapOvr>
+  <p:timing>
+    <p:tnLst>
+      <p:par>
+        <p:cTn id="1" dur="indefinite" restart="never" nodeType="tmRoot"/>
+      </p:par>
+    </p:tnLst>
+  </p:timing>
+</p:sld>
+</file>
+
+<file path=ppt/slides/slide12.xml><?xml version="1.0" encoding="utf-8"?>
+<p:sld xmlns:a="http://schemas.openxmlformats.org/drawingml/2006/main" xmlns:r="http://schemas.openxmlformats.org/officeDocument/2006/relationships" xmlns:p="http://schemas.openxmlformats.org/presentationml/2006/main" show="0">
+  <p:cSld>
+    <p:spTree>
+      <p:nvGrpSpPr>
+        <p:cNvPr id="1" name=""/>
+        <p:cNvGrpSpPr/>
+        <p:nvPr/>
+      </p:nvGrpSpPr>
+      <p:grpSpPr>
+        <a:xfrm>
+          <a:off x="0" y="0"/>
+          <a:ext cx="0" cy="0"/>
+          <a:chOff x="0" y="0"/>
+          <a:chExt cx="0" cy="0"/>
+        </a:xfrm>
+      </p:grpSpPr>
+      <p:sp>
+        <p:nvSpPr>
           <p:cNvPr id="3" name="Titel 2"/>
           <p:cNvSpPr>
             <a:spLocks noGrp="1"/>
@@ -9538,6 +9852,14 @@
   <p:clrMapOvr>
     <a:masterClrMapping/>
   </p:clrMapOvr>
+  <mc:AlternateContent xmlns:mc="http://schemas.openxmlformats.org/markup-compatibility/2006" xmlns:p14="http://schemas.microsoft.com/office/powerpoint/2010/main">
+    <mc:Choice Requires="p14">
+      <p:transition spd="slow" p14:dur="2000"/>
+    </mc:Choice>
+    <mc:Fallback xmlns="">
+      <p:transition spd="slow"/>
+    </mc:Fallback>
+  </mc:AlternateContent>
   <p:timing>
     <p:tnLst>
       <p:par>
@@ -9548,7 +9870,7 @@
 </p:sld>
 </file>
 
-<file path=ppt/slides/slide11.xml><?xml version="1.0" encoding="utf-8"?>
+<file path=ppt/slides/slide13.xml><?xml version="1.0" encoding="utf-8"?>
 <p:sld xmlns:a="http://schemas.openxmlformats.org/drawingml/2006/main" xmlns:r="http://schemas.openxmlformats.org/officeDocument/2006/relationships" xmlns:p="http://schemas.openxmlformats.org/presentationml/2006/main">
   <p:cSld>
     <p:spTree>
@@ -9651,7 +9973,7 @@
 </p:sld>
 </file>
 
-<file path=ppt/slides/slide12.xml><?xml version="1.0" encoding="utf-8"?>
+<file path=ppt/slides/slide14.xml><?xml version="1.0" encoding="utf-8"?>
 <p:sld xmlns:a="http://schemas.openxmlformats.org/drawingml/2006/main" xmlns:r="http://schemas.openxmlformats.org/officeDocument/2006/relationships" xmlns:p="http://schemas.openxmlformats.org/presentationml/2006/main">
   <p:cSld>
     <p:spTree>
@@ -9790,7 +10112,7 @@
 </p:sld>
 </file>
 
-<file path=ppt/slides/slide13.xml><?xml version="1.0" encoding="utf-8"?>
+<file path=ppt/slides/slide15.xml><?xml version="1.0" encoding="utf-8"?>
 <p:sld xmlns:a="http://schemas.openxmlformats.org/drawingml/2006/main" xmlns:r="http://schemas.openxmlformats.org/officeDocument/2006/relationships" xmlns:p="http://schemas.openxmlformats.org/presentationml/2006/main">
   <p:cSld>
     <p:spTree>
@@ -9892,7 +10214,7 @@
 </p:sld>
 </file>
 
-<file path=ppt/slides/slide14.xml><?xml version="1.0" encoding="utf-8"?>
+<file path=ppt/slides/slide16.xml><?xml version="1.0" encoding="utf-8"?>
 <p:sld xmlns:a="http://schemas.openxmlformats.org/drawingml/2006/main" xmlns:r="http://schemas.openxmlformats.org/officeDocument/2006/relationships" xmlns:p="http://schemas.openxmlformats.org/presentationml/2006/main">
   <p:cSld>
     <p:spTree>
@@ -10008,7 +10330,7 @@
 </p:sld>
 </file>
 
-<file path=ppt/slides/slide15.xml><?xml version="1.0" encoding="utf-8"?>
+<file path=ppt/slides/slide17.xml><?xml version="1.0" encoding="utf-8"?>
 <p:sld xmlns:a="http://schemas.openxmlformats.org/drawingml/2006/main" xmlns:r="http://schemas.openxmlformats.org/officeDocument/2006/relationships" xmlns:p="http://schemas.openxmlformats.org/presentationml/2006/main">
   <p:cSld>
     <p:spTree>
@@ -10433,58 +10755,21 @@
             </a:endParaRPr>
           </a:p>
           <a:p>
+            <a:pPr marL="457200" lvl="1" indent="0">
+              <a:buNone/>
+            </a:pPr>
+            <a:endParaRPr lang="de-CH" dirty="0" smtClean="0">
+              <a:sym typeface="Wingdings" panose="05000000000000000000" pitchFamily="2" charset="2"/>
+            </a:endParaRPr>
+          </a:p>
+          <a:p>
             <a:pPr lvl="1"/>
-            <a:r>
-              <a:rPr lang="de-CH" dirty="0" smtClean="0">
-                <a:sym typeface="Wingdings" panose="05000000000000000000" pitchFamily="2" charset="2"/>
-              </a:rPr>
-              <a:t>Expertensystem</a:t>
-            </a:r>
-          </a:p>
-          <a:p>
-            <a:pPr lvl="2"/>
-            <a:r>
-              <a:rPr lang="de-CH" dirty="0" smtClean="0">
-                <a:sym typeface="Wingdings" panose="05000000000000000000" pitchFamily="2" charset="2"/>
-              </a:rPr>
-              <a:t>Semantische Datenbank</a:t>
-            </a:r>
-          </a:p>
-          <a:p>
-            <a:pPr lvl="2"/>
-            <a:r>
-              <a:rPr lang="de-CH" dirty="0" smtClean="0">
-                <a:sym typeface="Wingdings" panose="05000000000000000000" pitchFamily="2" charset="2"/>
-              </a:rPr>
-              <a:t>Inferenzmaschine (</a:t>
-            </a:r>
-            <a:r>
-              <a:rPr lang="de-CH" dirty="0" err="1" smtClean="0">
-                <a:sym typeface="Wingdings" panose="05000000000000000000" pitchFamily="2" charset="2"/>
-              </a:rPr>
-              <a:t>Reasoner</a:t>
-            </a:r>
-            <a:r>
-              <a:rPr lang="de-CH" dirty="0" smtClean="0">
-                <a:sym typeface="Wingdings" panose="05000000000000000000" pitchFamily="2" charset="2"/>
-              </a:rPr>
-              <a:t>)</a:t>
-            </a:r>
-          </a:p>
-          <a:p>
-            <a:pPr lvl="2"/>
             <a:endParaRPr lang="de-CH" dirty="0">
               <a:sym typeface="Wingdings" panose="05000000000000000000" pitchFamily="2" charset="2"/>
             </a:endParaRPr>
           </a:p>
           <a:p>
-            <a:pPr lvl="1"/>
-            <a:r>
-              <a:rPr lang="de-CH" dirty="0" smtClean="0">
-                <a:sym typeface="Wingdings" panose="05000000000000000000" pitchFamily="2" charset="2"/>
-              </a:rPr>
-              <a:t>Ontologie</a:t>
-            </a:r>
+            <a:pPr lvl="2"/>
             <a:endParaRPr lang="de-CH" dirty="0">
               <a:sym typeface="Wingdings" panose="05000000000000000000" pitchFamily="2" charset="2"/>
             </a:endParaRPr>
@@ -10553,14 +10838,40 @@
           <a:chExt cx="0" cy="0"/>
         </a:xfrm>
       </p:grpSpPr>
-      <p:sp>
-        <p:nvSpPr>
-          <p:cNvPr id="2" name="Inhaltsplatzhalter 1"/>
-          <p:cNvSpPr>
-            <a:spLocks noGrp="1"/>
-          </p:cNvSpPr>
+      <p:pic>
+        <p:nvPicPr>
+          <p:cNvPr id="4" name="Inhaltsplatzhalter 3"/>
+          <p:cNvPicPr>
+            <a:picLocks noGrp="1" noChangeAspect="1"/>
+          </p:cNvPicPr>
           <p:nvPr>
             <p:ph sz="half" idx="1"/>
+          </p:nvPr>
+        </p:nvPicPr>
+        <p:blipFill>
+          <a:blip r:embed="rId3"/>
+          <a:stretch>
+            <a:fillRect/>
+          </a:stretch>
+        </p:blipFill>
+        <p:spPr>
+          <a:xfrm>
+            <a:off x="1293813" y="900000"/>
+            <a:ext cx="6143625" cy="4010025"/>
+          </a:xfrm>
+          <a:prstGeom prst="rect">
+            <a:avLst/>
+          </a:prstGeom>
+        </p:spPr>
+      </p:pic>
+      <p:sp>
+        <p:nvSpPr>
+          <p:cNvPr id="3" name="Titel 2"/>
+          <p:cNvSpPr>
+            <a:spLocks noGrp="1"/>
+          </p:cNvSpPr>
+          <p:nvPr>
+            <p:ph type="ctrTitle"/>
           </p:nvPr>
         </p:nvSpPr>
         <p:spPr/>
@@ -10568,98 +10879,20 @@
           <a:bodyPr/>
           <a:lstStyle/>
           <a:p>
-            <a:r>
-              <a:rPr lang="de-CH" dirty="0"/>
-              <a:t>Aufbau und Anwendung einer </a:t>
-            </a:r>
-            <a:r>
-              <a:rPr lang="de-CH" dirty="0" smtClean="0"/>
-              <a:t>semantischen </a:t>
-            </a:r>
-            <a:r>
-              <a:rPr lang="de-CH" dirty="0"/>
-              <a:t>Datenbank</a:t>
-            </a:r>
-          </a:p>
-          <a:p>
-            <a:pPr lvl="1"/>
-            <a:r>
-              <a:rPr lang="de-CH" dirty="0"/>
-              <a:t>Theoretischer Teil</a:t>
-            </a:r>
-          </a:p>
-          <a:p>
-            <a:pPr lvl="2"/>
-            <a:r>
-              <a:rPr lang="de-CH" dirty="0"/>
-              <a:t>Tutorial</a:t>
-            </a:r>
-          </a:p>
-          <a:p>
-            <a:pPr lvl="1"/>
-            <a:r>
-              <a:rPr lang="de-CH" dirty="0"/>
-              <a:t>Praktischer Teil</a:t>
-            </a:r>
-          </a:p>
-          <a:p>
-            <a:pPr lvl="2"/>
-            <a:r>
-              <a:rPr lang="de-CH" dirty="0"/>
-              <a:t>Aufbau Ontologie</a:t>
-            </a:r>
-          </a:p>
-          <a:p>
-            <a:pPr lvl="2"/>
-            <a:r>
-              <a:rPr lang="de-CH" dirty="0"/>
-              <a:t>Benutzerschnittstelle</a:t>
-            </a:r>
-          </a:p>
-          <a:p>
-            <a:endParaRPr lang="de-CH" dirty="0"/>
-          </a:p>
-        </p:txBody>
-      </p:sp>
-      <p:sp>
-        <p:nvSpPr>
-          <p:cNvPr id="3" name="Titel 2"/>
-          <p:cNvSpPr>
-            <a:spLocks noGrp="1"/>
-          </p:cNvSpPr>
-          <p:nvPr>
-            <p:ph type="ctrTitle"/>
-          </p:nvPr>
-        </p:nvSpPr>
-        <p:spPr/>
-        <p:txBody>
-          <a:bodyPr/>
-          <a:lstStyle/>
-          <a:p>
-            <a:r>
-              <a:rPr lang="de-CH" dirty="0"/>
-              <a:t>Ziel</a:t>
-            </a:r>
+            <a:endParaRPr lang="de-CH"/>
           </a:p>
         </p:txBody>
       </p:sp>
     </p:spTree>
     <p:extLst>
       <p:ext uri="{BB962C8B-B14F-4D97-AF65-F5344CB8AC3E}">
-        <p14:creationId xmlns:p14="http://schemas.microsoft.com/office/powerpoint/2010/main" val="1939819203"/>
+        <p14:creationId xmlns:p14="http://schemas.microsoft.com/office/powerpoint/2010/main" val="2089243429"/>
       </p:ext>
     </p:extLst>
   </p:cSld>
   <p:clrMapOvr>
     <a:masterClrMapping/>
   </p:clrMapOvr>
-  <p:timing>
-    <p:tnLst>
-      <p:par>
-        <p:cTn id="1" dur="indefinite" restart="never" nodeType="tmRoot"/>
-      </p:par>
-    </p:tnLst>
-  </p:timing>
 </p:sld>
 </file>
 
@@ -10695,60 +10928,42 @@
           <a:bodyPr/>
           <a:lstStyle/>
           <a:p>
-            <a:r>
-              <a:rPr lang="de-CH" dirty="0"/>
-              <a:t>Vorgehen Knowledge Engineer</a:t>
-            </a:r>
-          </a:p>
-          <a:p>
             <a:pPr lvl="1"/>
             <a:r>
-              <a:rPr lang="de-CH" dirty="0"/>
-              <a:t>Problemdomäne systematisch modellieren und formalisieren</a:t>
+              <a:rPr lang="de-CH" dirty="0">
+                <a:sym typeface="Wingdings" panose="05000000000000000000" pitchFamily="2" charset="2"/>
+              </a:rPr>
+              <a:t>Expertensystem</a:t>
             </a:r>
           </a:p>
           <a:p>
             <a:pPr lvl="2"/>
-            <a:endParaRPr lang="de-CH" dirty="0"/>
+            <a:r>
+              <a:rPr lang="de-CH" dirty="0">
+                <a:sym typeface="Wingdings" panose="05000000000000000000" pitchFamily="2" charset="2"/>
+              </a:rPr>
+              <a:t>Semantische Datenbank</a:t>
+            </a:r>
           </a:p>
           <a:p>
             <a:pPr lvl="2"/>
-            <a:endParaRPr lang="de-CH" dirty="0"/>
-          </a:p>
-          <a:p>
-            <a:r>
-              <a:rPr lang="de-CH" dirty="0"/>
-              <a:t>Aufbau </a:t>
-            </a:r>
-          </a:p>
-          <a:p>
-            <a:pPr lvl="1"/>
-            <a:r>
-              <a:rPr lang="de-CH" dirty="0"/>
-              <a:t>Theoretisches Hintergrundwissen zur Wissensmodellierung</a:t>
-            </a:r>
-          </a:p>
-          <a:p>
-            <a:pPr lvl="1"/>
-            <a:r>
-              <a:rPr lang="de-CH" dirty="0"/>
-              <a:t>Praktisches Beispiel </a:t>
-            </a:r>
-            <a:r>
-              <a:rPr lang="de-CH" dirty="0" smtClean="0"/>
-              <a:t>Expertensystem</a:t>
-            </a:r>
-            <a:endParaRPr lang="de-CH" dirty="0" smtClean="0"/>
-          </a:p>
-          <a:p>
-            <a:pPr lvl="1"/>
-            <a:r>
-              <a:rPr lang="de-CH" dirty="0" smtClean="0"/>
-              <a:t>Gesammelte </a:t>
-            </a:r>
-            <a:r>
-              <a:rPr lang="de-CH" dirty="0"/>
-              <a:t>Erfahrungen</a:t>
+            <a:r>
+              <a:rPr lang="de-CH" dirty="0">
+                <a:sym typeface="Wingdings" panose="05000000000000000000" pitchFamily="2" charset="2"/>
+              </a:rPr>
+              <a:t>Inferenzmaschine (</a:t>
+            </a:r>
+            <a:r>
+              <a:rPr lang="de-CH" dirty="0" err="1">
+                <a:sym typeface="Wingdings" panose="05000000000000000000" pitchFamily="2" charset="2"/>
+              </a:rPr>
+              <a:t>Reasoner</a:t>
+            </a:r>
+            <a:r>
+              <a:rPr lang="de-CH" dirty="0">
+                <a:sym typeface="Wingdings" panose="05000000000000000000" pitchFamily="2" charset="2"/>
+              </a:rPr>
+              <a:t>)</a:t>
             </a:r>
           </a:p>
           <a:p>
@@ -10772,29 +10987,47 @@
           <a:lstStyle/>
           <a:p>
             <a:r>
-              <a:rPr lang="de-CH" dirty="0"/>
-              <a:t>Tutorial</a:t>
-            </a:r>
-          </a:p>
-        </p:txBody>
-      </p:sp>
+              <a:rPr lang="de-CH" dirty="0" smtClean="0"/>
+              <a:t>Wissensabbildung</a:t>
+            </a:r>
+            <a:endParaRPr lang="de-CH" dirty="0"/>
+          </a:p>
+        </p:txBody>
+      </p:sp>
+      <p:pic>
+        <p:nvPicPr>
+          <p:cNvPr id="4" name="Grafik 3"/>
+          <p:cNvPicPr>
+            <a:picLocks noChangeAspect="1"/>
+          </p:cNvPicPr>
+          <p:nvPr/>
+        </p:nvPicPr>
+        <p:blipFill>
+          <a:blip r:embed="rId3"/>
+          <a:stretch>
+            <a:fillRect/>
+          </a:stretch>
+        </p:blipFill>
+        <p:spPr>
+          <a:xfrm>
+            <a:off x="5091375" y="1343025"/>
+            <a:ext cx="3476625" cy="4476750"/>
+          </a:xfrm>
+          <a:prstGeom prst="rect">
+            <a:avLst/>
+          </a:prstGeom>
+        </p:spPr>
+      </p:pic>
     </p:spTree>
     <p:extLst>
       <p:ext uri="{BB962C8B-B14F-4D97-AF65-F5344CB8AC3E}">
-        <p14:creationId xmlns:p14="http://schemas.microsoft.com/office/powerpoint/2010/main" val="2960236127"/>
+        <p14:creationId xmlns:p14="http://schemas.microsoft.com/office/powerpoint/2010/main" val="2985660709"/>
       </p:ext>
     </p:extLst>
   </p:cSld>
   <p:clrMapOvr>
     <a:masterClrMapping/>
   </p:clrMapOvr>
-  <p:timing>
-    <p:tnLst>
-      <p:par>
-        <p:cTn id="1" dur="indefinite" restart="never" nodeType="tmRoot"/>
-      </p:par>
-    </p:tnLst>
-  </p:timing>
 </p:sld>
 </file>
 
@@ -10832,68 +11065,51 @@
           <a:p>
             <a:r>
               <a:rPr lang="de-CH" dirty="0"/>
-              <a:t>Problemdomäne Reisen</a:t>
+              <a:t>Aufbau und Anwendung einer </a:t>
+            </a:r>
+            <a:r>
+              <a:rPr lang="de-CH" dirty="0" smtClean="0"/>
+              <a:t>semantischen </a:t>
+            </a:r>
+            <a:r>
+              <a:rPr lang="de-CH" dirty="0"/>
+              <a:t>Datenbank</a:t>
             </a:r>
           </a:p>
           <a:p>
             <a:pPr lvl="1"/>
             <a:r>
               <a:rPr lang="de-CH" dirty="0"/>
-              <a:t>Ursprünglich </a:t>
-            </a:r>
-            <a:r>
-              <a:rPr lang="de-CH" dirty="0" smtClean="0"/>
-              <a:t>Prolog</a:t>
-            </a:r>
-            <a:endParaRPr lang="de-CH" dirty="0"/>
+              <a:t>Theoretischer Teil</a:t>
+            </a:r>
+          </a:p>
+          <a:p>
+            <a:pPr lvl="2"/>
+            <a:r>
+              <a:rPr lang="de-CH" dirty="0"/>
+              <a:t>Tutorial</a:t>
+            </a:r>
           </a:p>
           <a:p>
             <a:pPr lvl="1"/>
             <a:r>
               <a:rPr lang="de-CH" dirty="0"/>
-              <a:t>Klarer </a:t>
-            </a:r>
-            <a:r>
-              <a:rPr lang="de-CH" dirty="0" smtClean="0"/>
-              <a:t>Rahmen</a:t>
-            </a:r>
-          </a:p>
-          <a:p>
-            <a:pPr marL="457200" lvl="1" indent="0">
-              <a:buNone/>
-            </a:pPr>
-            <a:endParaRPr lang="de-CH" dirty="0"/>
-          </a:p>
-          <a:p>
+              <a:t>Praktischer Teil</a:t>
+            </a:r>
+          </a:p>
+          <a:p>
+            <a:pPr lvl="2"/>
             <a:r>
               <a:rPr lang="de-CH" dirty="0"/>
-              <a:t>Werkzeuge </a:t>
-            </a:r>
-            <a:endParaRPr lang="de-CH" dirty="0" smtClean="0"/>
-          </a:p>
-          <a:p>
-            <a:pPr lvl="1"/>
-            <a:r>
-              <a:rPr lang="de-CH" dirty="0" err="1" smtClean="0"/>
-              <a:t>Stanbol</a:t>
-            </a:r>
-            <a:endParaRPr lang="de-CH" dirty="0"/>
-          </a:p>
-          <a:p>
-            <a:pPr lvl="1"/>
-            <a:r>
-              <a:rPr lang="de-CH" dirty="0" err="1" smtClean="0"/>
-              <a:t>Protégé</a:t>
-            </a:r>
-            <a:endParaRPr lang="de-CH" dirty="0" smtClean="0"/>
-          </a:p>
-          <a:p>
-            <a:pPr lvl="1"/>
-            <a:r>
-              <a:rPr lang="de-CH" dirty="0" err="1" smtClean="0"/>
-              <a:t>Stardog</a:t>
-            </a:r>
-            <a:endParaRPr lang="de-CH" dirty="0"/>
+              <a:t>Aufbau Ontologie</a:t>
+            </a:r>
+          </a:p>
+          <a:p>
+            <a:pPr lvl="2"/>
+            <a:r>
+              <a:rPr lang="de-CH" dirty="0"/>
+              <a:t>Benutzerschnittstelle</a:t>
+            </a:r>
           </a:p>
           <a:p>
             <a:endParaRPr lang="de-CH" dirty="0"/>
@@ -10916,17 +11132,16 @@
           <a:lstStyle/>
           <a:p>
             <a:r>
-              <a:rPr lang="de-CH" dirty="0" smtClean="0"/>
-              <a:t>Ontologie</a:t>
-            </a:r>
-            <a:endParaRPr lang="de-CH" dirty="0"/>
+              <a:rPr lang="de-CH" dirty="0"/>
+              <a:t>Ziel</a:t>
+            </a:r>
           </a:p>
         </p:txBody>
       </p:sp>
     </p:spTree>
     <p:extLst>
       <p:ext uri="{BB962C8B-B14F-4D97-AF65-F5344CB8AC3E}">
-        <p14:creationId xmlns:p14="http://schemas.microsoft.com/office/powerpoint/2010/main" val="1258177134"/>
+        <p14:creationId xmlns:p14="http://schemas.microsoft.com/office/powerpoint/2010/main" val="1939819203"/>
       </p:ext>
     </p:extLst>
   </p:cSld>
@@ -10976,104 +11191,61 @@
           <a:lstStyle/>
           <a:p>
             <a:r>
+              <a:rPr lang="de-CH" dirty="0"/>
+              <a:t>Vorgehen Knowledge Engineer</a:t>
+            </a:r>
+          </a:p>
+          <a:p>
+            <a:pPr lvl="1"/>
+            <a:r>
+              <a:rPr lang="de-CH" dirty="0"/>
+              <a:t>Problemdomäne systematisch modellieren und formalisieren</a:t>
+            </a:r>
+          </a:p>
+          <a:p>
+            <a:pPr lvl="2"/>
+            <a:endParaRPr lang="de-CH" dirty="0"/>
+          </a:p>
+          <a:p>
+            <a:pPr lvl="2"/>
+            <a:endParaRPr lang="de-CH" dirty="0"/>
+          </a:p>
+          <a:p>
+            <a:r>
+              <a:rPr lang="de-CH" dirty="0"/>
+              <a:t>Aufbau </a:t>
+            </a:r>
+          </a:p>
+          <a:p>
+            <a:pPr lvl="1"/>
+            <a:r>
+              <a:rPr lang="de-CH" dirty="0"/>
+              <a:t>Theoretisches Hintergrundwissen zur Wissensmodellierung</a:t>
+            </a:r>
+          </a:p>
+          <a:p>
+            <a:pPr lvl="1"/>
+            <a:r>
+              <a:rPr lang="de-CH" dirty="0"/>
+              <a:t>Praktisches Beispiel </a:t>
+            </a:r>
+            <a:r>
               <a:rPr lang="de-CH" dirty="0" smtClean="0"/>
-              <a:t>Tripel: </a:t>
+              <a:t>Expertensystem</a:t>
             </a:r>
           </a:p>
           <a:p>
             <a:pPr lvl="1"/>
             <a:r>
               <a:rPr lang="de-CH" dirty="0" smtClean="0"/>
-              <a:t>Subjekt</a:t>
-            </a:r>
-          </a:p>
-          <a:p>
-            <a:pPr lvl="1"/>
-            <a:r>
-              <a:rPr lang="de-CH" dirty="0" smtClean="0"/>
-              <a:t>Prädikat</a:t>
-            </a:r>
-          </a:p>
-          <a:p>
-            <a:pPr lvl="1"/>
-            <a:r>
-              <a:rPr lang="de-CH" dirty="0" smtClean="0"/>
-              <a:t>Objekt</a:t>
-            </a:r>
-            <a:endParaRPr lang="de-CH" dirty="0" smtClean="0"/>
-          </a:p>
-          <a:p>
-            <a:r>
-              <a:rPr lang="de-CH" dirty="0" smtClean="0"/>
-              <a:t>Bestandteile</a:t>
-            </a:r>
-            <a:endParaRPr lang="de-CH" dirty="0"/>
-          </a:p>
-          <a:p>
-            <a:pPr lvl="1"/>
+              <a:t>Gesammelte </a:t>
+            </a:r>
             <a:r>
               <a:rPr lang="de-CH" dirty="0"/>
-              <a:t>Klassen</a:t>
-            </a:r>
-          </a:p>
-          <a:p>
-            <a:pPr lvl="1"/>
-            <a:r>
-              <a:rPr lang="de-CH" dirty="0"/>
-              <a:t>Individuen</a:t>
-            </a:r>
-          </a:p>
-          <a:p>
-            <a:pPr lvl="1"/>
-            <a:r>
-              <a:rPr lang="de-CH" dirty="0"/>
-              <a:t>Eigenschaften </a:t>
-            </a:r>
-          </a:p>
-          <a:p>
-            <a:pPr lvl="1"/>
-            <a:r>
-              <a:rPr lang="de-CH" dirty="0"/>
-              <a:t>Beziehungen</a:t>
-            </a:r>
-          </a:p>
-          <a:p>
-            <a:pPr lvl="1"/>
-            <a:r>
-              <a:rPr lang="de-CH" dirty="0" smtClean="0"/>
-              <a:t>Regeln</a:t>
-            </a:r>
-          </a:p>
-          <a:p>
-            <a:pPr marL="457200" lvl="1" indent="0">
-              <a:buNone/>
-            </a:pPr>
-            <a:endParaRPr lang="de-CH" dirty="0">
-              <a:sym typeface="Wingdings" panose="05000000000000000000" pitchFamily="2" charset="2"/>
-            </a:endParaRPr>
-          </a:p>
-          <a:p>
-            <a:pPr marL="0" indent="-14287">
-              <a:buNone/>
-            </a:pPr>
-            <a:r>
-              <a:rPr lang="de-CH" dirty="0" smtClean="0">
-                <a:sym typeface="Wingdings" panose="05000000000000000000" pitchFamily="2" charset="2"/>
-              </a:rPr>
-              <a:t> </a:t>
-            </a:r>
-            <a:r>
-              <a:rPr lang="de-CH" dirty="0">
-                <a:sym typeface="Wingdings" panose="05000000000000000000" pitchFamily="2" charset="2"/>
-              </a:rPr>
-              <a:t>Semantische Datenbank</a:t>
-            </a:r>
-            <a:endParaRPr lang="de-CH" dirty="0"/>
-          </a:p>
-          <a:p>
-            <a:pPr marL="0" indent="0">
-              <a:buNone/>
-            </a:pPr>
+              <a:t>Erfahrungen</a:t>
+            </a:r>
+          </a:p>
+          <a:p>
             <a:endParaRPr lang="de-CH" dirty="0"/>
           </a:p>
         </p:txBody>
@@ -11095,15 +11267,63 @@
           <a:p>
             <a:r>
               <a:rPr lang="de-CH" dirty="0"/>
-              <a:t>Aufbau Ontologie</a:t>
-            </a:r>
-          </a:p>
-        </p:txBody>
-      </p:sp>
+              <a:t>Tutorial</a:t>
+            </a:r>
+          </a:p>
+        </p:txBody>
+      </p:sp>
+      <p:pic>
+        <p:nvPicPr>
+          <p:cNvPr id="4" name="Grafik 3"/>
+          <p:cNvPicPr>
+            <a:picLocks noChangeAspect="1"/>
+          </p:cNvPicPr>
+          <p:nvPr/>
+        </p:nvPicPr>
+        <p:blipFill>
+          <a:blip r:embed="rId3"/>
+          <a:stretch>
+            <a:fillRect/>
+          </a:stretch>
+        </p:blipFill>
+        <p:spPr>
+          <a:xfrm>
+            <a:off x="1007113" y="4420780"/>
+            <a:ext cx="1484312" cy="1449793"/>
+          </a:xfrm>
+          <a:prstGeom prst="rect">
+            <a:avLst/>
+          </a:prstGeom>
+        </p:spPr>
+      </p:pic>
+      <p:pic>
+        <p:nvPicPr>
+          <p:cNvPr id="5" name="Grafik 4"/>
+          <p:cNvPicPr>
+            <a:picLocks noChangeAspect="1"/>
+          </p:cNvPicPr>
+          <p:nvPr/>
+        </p:nvPicPr>
+        <p:blipFill>
+          <a:blip r:embed="rId4"/>
+          <a:stretch>
+            <a:fillRect/>
+          </a:stretch>
+        </p:blipFill>
+        <p:spPr>
+          <a:xfrm>
+            <a:off x="3770450" y="4420781"/>
+            <a:ext cx="1495099" cy="1449793"/>
+          </a:xfrm>
+          <a:prstGeom prst="rect">
+            <a:avLst/>
+          </a:prstGeom>
+        </p:spPr>
+      </p:pic>
     </p:spTree>
     <p:extLst>
       <p:ext uri="{BB962C8B-B14F-4D97-AF65-F5344CB8AC3E}">
-        <p14:creationId xmlns:p14="http://schemas.microsoft.com/office/powerpoint/2010/main" val="2926770482"/>
+        <p14:creationId xmlns:p14="http://schemas.microsoft.com/office/powerpoint/2010/main" val="2960236127"/>
       </p:ext>
     </p:extLst>
   </p:cSld>
@@ -11137,40 +11357,14 @@
           <a:chExt cx="0" cy="0"/>
         </a:xfrm>
       </p:grpSpPr>
-      <p:pic>
-        <p:nvPicPr>
-          <p:cNvPr id="5" name="Inhaltsplatzhalter 4"/>
-          <p:cNvPicPr>
-            <a:picLocks noGrp="1" noChangeAspect="1"/>
-          </p:cNvPicPr>
+      <p:sp>
+        <p:nvSpPr>
+          <p:cNvPr id="2" name="Inhaltsplatzhalter 1"/>
+          <p:cNvSpPr>
+            <a:spLocks noGrp="1"/>
+          </p:cNvSpPr>
           <p:nvPr>
             <p:ph sz="half" idx="1"/>
-          </p:nvPr>
-        </p:nvPicPr>
-        <p:blipFill>
-          <a:blip r:embed="rId3"/>
-          <a:stretch>
-            <a:fillRect/>
-          </a:stretch>
-        </p:blipFill>
-        <p:spPr>
-          <a:xfrm>
-            <a:off x="758247" y="1135063"/>
-            <a:ext cx="6735785" cy="4679950"/>
-          </a:xfrm>
-          <a:prstGeom prst="rect">
-            <a:avLst/>
-          </a:prstGeom>
-        </p:spPr>
-      </p:pic>
-      <p:sp>
-        <p:nvSpPr>
-          <p:cNvPr id="3" name="Titel 2"/>
-          <p:cNvSpPr>
-            <a:spLocks noGrp="1"/>
-          </p:cNvSpPr>
-          <p:nvPr>
-            <p:ph type="ctrTitle"/>
           </p:nvPr>
         </p:nvSpPr>
         <p:spPr/>
@@ -11179,8 +11373,92 @@
           <a:lstStyle/>
           <a:p>
             <a:r>
+              <a:rPr lang="de-CH" dirty="0"/>
+              <a:t>Problemdomäne Reisen</a:t>
+            </a:r>
+          </a:p>
+          <a:p>
+            <a:pPr lvl="1"/>
+            <a:r>
+              <a:rPr lang="de-CH" dirty="0"/>
+              <a:t>Ursprünglich </a:t>
+            </a:r>
+            <a:r>
               <a:rPr lang="de-CH" dirty="0" smtClean="0"/>
-              <a:t>Ontologie abbilden</a:t>
+              <a:t>Prolog</a:t>
+            </a:r>
+            <a:endParaRPr lang="de-CH" dirty="0"/>
+          </a:p>
+          <a:p>
+            <a:pPr lvl="1"/>
+            <a:r>
+              <a:rPr lang="de-CH" dirty="0"/>
+              <a:t>Klarer </a:t>
+            </a:r>
+            <a:r>
+              <a:rPr lang="de-CH" dirty="0" smtClean="0"/>
+              <a:t>Rahmen</a:t>
+            </a:r>
+          </a:p>
+          <a:p>
+            <a:pPr marL="457200" lvl="1" indent="0">
+              <a:buNone/>
+            </a:pPr>
+            <a:endParaRPr lang="de-CH" dirty="0"/>
+          </a:p>
+          <a:p>
+            <a:r>
+              <a:rPr lang="de-CH" dirty="0" smtClean="0"/>
+              <a:t>Werkzeuge </a:t>
+            </a:r>
+          </a:p>
+          <a:p>
+            <a:pPr lvl="1"/>
+            <a:r>
+              <a:rPr lang="de-CH" dirty="0" err="1" smtClean="0"/>
+              <a:t>yEd</a:t>
+            </a:r>
+            <a:endParaRPr lang="de-CH" dirty="0" smtClean="0"/>
+          </a:p>
+          <a:p>
+            <a:pPr lvl="1"/>
+            <a:r>
+              <a:rPr lang="de-CH" dirty="0" err="1" smtClean="0"/>
+              <a:t>Protégé</a:t>
+            </a:r>
+            <a:endParaRPr lang="de-CH" dirty="0" smtClean="0"/>
+          </a:p>
+          <a:p>
+            <a:pPr lvl="1"/>
+            <a:r>
+              <a:rPr lang="de-CH" dirty="0" err="1" smtClean="0"/>
+              <a:t>Stardog</a:t>
+            </a:r>
+            <a:endParaRPr lang="de-CH" dirty="0" smtClean="0"/>
+          </a:p>
+          <a:p>
+            <a:endParaRPr lang="de-CH" dirty="0"/>
+          </a:p>
+        </p:txBody>
+      </p:sp>
+      <p:sp>
+        <p:nvSpPr>
+          <p:cNvPr id="3" name="Titel 2"/>
+          <p:cNvSpPr>
+            <a:spLocks noGrp="1"/>
+          </p:cNvSpPr>
+          <p:nvPr>
+            <p:ph type="ctrTitle"/>
+          </p:nvPr>
+        </p:nvSpPr>
+        <p:spPr/>
+        <p:txBody>
+          <a:bodyPr/>
+          <a:lstStyle/>
+          <a:p>
+            <a:r>
+              <a:rPr lang="de-CH" dirty="0" smtClean="0"/>
+              <a:t>Ontologie</a:t>
             </a:r>
             <a:endParaRPr lang="de-CH" dirty="0"/>
           </a:p>
@@ -11189,7 +11467,7 @@
     </p:spTree>
     <p:extLst>
       <p:ext uri="{BB962C8B-B14F-4D97-AF65-F5344CB8AC3E}">
-        <p14:creationId xmlns:p14="http://schemas.microsoft.com/office/powerpoint/2010/main" val="493163707"/>
+        <p14:creationId xmlns:p14="http://schemas.microsoft.com/office/powerpoint/2010/main" val="1258177134"/>
       </p:ext>
     </p:extLst>
   </p:cSld>
@@ -12238,16 +12516,16 @@
 <file path=customXml/itemProps3.xml><?xml version="1.0" encoding="utf-8"?>
 <ds:datastoreItem xmlns:ds="http://schemas.openxmlformats.org/officeDocument/2006/customXml" ds:itemID="{96591048-6F15-48C6-9650-9BFF3E56974F}">
   <ds:schemaRefs>
+    <ds:schemaRef ds:uri="http://schemas.microsoft.com/office/infopath/2007/PartnerControls"/>
     <ds:schemaRef ds:uri="http://schemas.openxmlformats.org/package/2006/metadata/core-properties"/>
+    <ds:schemaRef ds:uri="http://purl.org/dc/terms/"/>
     <ds:schemaRef ds:uri="http://purl.org/dc/elements/1.1/"/>
     <ds:schemaRef ds:uri="2551ef7e-3b29-44d1-a8ad-ef34c26bfc60"/>
     <ds:schemaRef ds:uri="http://schemas.microsoft.com/office/2006/metadata/properties"/>
-    <ds:schemaRef ds:uri="http://purl.org/dc/terms/"/>
+    <ds:schemaRef ds:uri="http://purl.org/dc/dcmitype/"/>
     <ds:schemaRef ds:uri="http://schemas.microsoft.com/office/2006/documentManagement/types"/>
     <ds:schemaRef ds:uri="http://www.w3.org/XML/1998/namespace"/>
-    <ds:schemaRef ds:uri="http://schemas.microsoft.com/office/infopath/2007/PartnerControls"/>
     <ds:schemaRef ds:uri="63c724b1-652e-424f-8d99-4ee509067280"/>
-    <ds:schemaRef ds:uri="http://purl.org/dc/dcmitype/"/>
   </ds:schemaRefs>
 </ds:datastoreItem>
 </file>
</xml_diff>